<commit_message>
Revert "Merge branch 'HSJ'"
This reverts commit 7a242c4133202a3806099db56abaead2520592fa, reversing
changes made to dcd9927d035a72f71aa8896db2f337b7d7c26435.
</commit_message>
<xml_diff>
--- a/CG_Final_Project/파이널 프로젝트 .pptx
+++ b/CG_Final_Project/파이널 프로젝트 .pptx
@@ -7,8 +7,7 @@
   <p:sldIdLst>
     <p:sldId id="256" r:id="rId2"/>
     <p:sldId id="257" r:id="rId3"/>
-    <p:sldId id="259" r:id="rId4"/>
-    <p:sldId id="258" r:id="rId5"/>
+    <p:sldId id="258" r:id="rId4"/>
   </p:sldIdLst>
   <p:sldSz cx="12192000" cy="6858000"/>
   <p:notesSz cx="6858000" cy="9144000"/>
@@ -5310,2337 +5309,6 @@
           <a:chExt cx="0" cy="0"/>
         </a:xfrm>
       </p:grpSpPr>
-      <p:sp>
-        <p:nvSpPr>
-          <p:cNvPr id="4" name="직사각형 3">
-            <a:extLst>
-              <a:ext uri="{FF2B5EF4-FFF2-40B4-BE49-F238E27FC236}">
-                <a16:creationId xmlns:a16="http://schemas.microsoft.com/office/drawing/2014/main" id="{8EEC2752-2F31-4F33-AFB2-F3E9FF22CAE5}"/>
-              </a:ext>
-            </a:extLst>
-          </p:cNvPr>
-          <p:cNvSpPr>
-            <a:spLocks/>
-          </p:cNvSpPr>
-          <p:nvPr/>
-        </p:nvSpPr>
-        <p:spPr>
-          <a:xfrm>
-            <a:off x="696000" y="909000"/>
-            <a:ext cx="3600000" cy="3600000"/>
-          </a:xfrm>
-          <a:prstGeom prst="rect">
-            <a:avLst/>
-          </a:prstGeom>
-          <a:noFill/>
-          <a:ln w="25400"/>
-        </p:spPr>
-        <p:style>
-          <a:lnRef idx="2">
-            <a:schemeClr val="accent1">
-              <a:shade val="50000"/>
-            </a:schemeClr>
-          </a:lnRef>
-          <a:fillRef idx="1">
-            <a:schemeClr val="accent1"/>
-          </a:fillRef>
-          <a:effectRef idx="0">
-            <a:schemeClr val="accent1"/>
-          </a:effectRef>
-          <a:fontRef idx="minor">
-            <a:schemeClr val="lt1"/>
-          </a:fontRef>
-        </p:style>
-        <p:txBody>
-          <a:bodyPr rtlCol="0" anchor="ctr"/>
-          <a:lstStyle/>
-          <a:p>
-            <a:pPr algn="ctr"/>
-            <a:endParaRPr lang="ko-KR" altLang="en-US"/>
-          </a:p>
-        </p:txBody>
-      </p:sp>
-      <p:sp>
-        <p:nvSpPr>
-          <p:cNvPr id="5" name="직사각형 4">
-            <a:extLst>
-              <a:ext uri="{FF2B5EF4-FFF2-40B4-BE49-F238E27FC236}">
-                <a16:creationId xmlns:a16="http://schemas.microsoft.com/office/drawing/2014/main" id="{24CB5D56-4BAB-4D5E-B773-D0852F5213E9}"/>
-              </a:ext>
-            </a:extLst>
-          </p:cNvPr>
-          <p:cNvSpPr/>
-          <p:nvPr/>
-        </p:nvSpPr>
-        <p:spPr>
-          <a:xfrm>
-            <a:off x="1056000" y="4149000"/>
-            <a:ext cx="765719" cy="45719"/>
-          </a:xfrm>
-          <a:prstGeom prst="rect">
-            <a:avLst/>
-          </a:prstGeom>
-        </p:spPr>
-        <p:style>
-          <a:lnRef idx="2">
-            <a:schemeClr val="accent1">
-              <a:shade val="50000"/>
-            </a:schemeClr>
-          </a:lnRef>
-          <a:fillRef idx="1">
-            <a:schemeClr val="accent1"/>
-          </a:fillRef>
-          <a:effectRef idx="0">
-            <a:schemeClr val="accent1"/>
-          </a:effectRef>
-          <a:fontRef idx="minor">
-            <a:schemeClr val="lt1"/>
-          </a:fontRef>
-        </p:style>
-        <p:txBody>
-          <a:bodyPr rtlCol="0" anchor="ctr"/>
-          <a:lstStyle/>
-          <a:p>
-            <a:pPr algn="ctr"/>
-            <a:endParaRPr lang="ko-KR" altLang="en-US"/>
-          </a:p>
-        </p:txBody>
-      </p:sp>
-      <p:pic>
-        <p:nvPicPr>
-          <p:cNvPr id="7" name="그림 6">
-            <a:extLst>
-              <a:ext uri="{FF2B5EF4-FFF2-40B4-BE49-F238E27FC236}">
-                <a16:creationId xmlns:a16="http://schemas.microsoft.com/office/drawing/2014/main" id="{4354C7D0-7EB5-4AEB-A11E-B6B49805739F}"/>
-              </a:ext>
-            </a:extLst>
-          </p:cNvPr>
-          <p:cNvPicPr>
-            <a:picLocks noChangeAspect="1"/>
-          </p:cNvPicPr>
-          <p:nvPr/>
-        </p:nvPicPr>
-        <p:blipFill>
-          <a:blip r:embed="rId2"/>
-          <a:stretch>
-            <a:fillRect/>
-          </a:stretch>
-        </p:blipFill>
-        <p:spPr>
-          <a:xfrm>
-            <a:off x="5016000" y="549000"/>
-            <a:ext cx="4248150" cy="4676775"/>
-          </a:xfrm>
-          <a:prstGeom prst="rect">
-            <a:avLst/>
-          </a:prstGeom>
-        </p:spPr>
-      </p:pic>
-      <p:sp>
-        <p:nvSpPr>
-          <p:cNvPr id="8" name="직사각형 7">
-            <a:extLst>
-              <a:ext uri="{FF2B5EF4-FFF2-40B4-BE49-F238E27FC236}">
-                <a16:creationId xmlns:a16="http://schemas.microsoft.com/office/drawing/2014/main" id="{CE1C4586-7253-4887-A2E9-8B106614C80A}"/>
-              </a:ext>
-            </a:extLst>
-          </p:cNvPr>
-          <p:cNvSpPr/>
-          <p:nvPr/>
-        </p:nvSpPr>
-        <p:spPr>
-          <a:xfrm>
-            <a:off x="1416539" y="3789000"/>
-            <a:ext cx="45719" cy="360000"/>
-          </a:xfrm>
-          <a:prstGeom prst="rect">
-            <a:avLst/>
-          </a:prstGeom>
-        </p:spPr>
-        <p:style>
-          <a:lnRef idx="2">
-            <a:schemeClr val="accent1">
-              <a:shade val="50000"/>
-            </a:schemeClr>
-          </a:lnRef>
-          <a:fillRef idx="1">
-            <a:schemeClr val="accent1"/>
-          </a:fillRef>
-          <a:effectRef idx="0">
-            <a:schemeClr val="accent1"/>
-          </a:effectRef>
-          <a:fontRef idx="minor">
-            <a:schemeClr val="lt1"/>
-          </a:fontRef>
-        </p:style>
-        <p:txBody>
-          <a:bodyPr rtlCol="0" anchor="ctr"/>
-          <a:lstStyle/>
-          <a:p>
-            <a:pPr algn="ctr"/>
-            <a:endParaRPr lang="ko-KR" altLang="en-US"/>
-          </a:p>
-        </p:txBody>
-      </p:sp>
-      <p:sp>
-        <p:nvSpPr>
-          <p:cNvPr id="9" name="직사각형 8">
-            <a:extLst>
-              <a:ext uri="{FF2B5EF4-FFF2-40B4-BE49-F238E27FC236}">
-                <a16:creationId xmlns:a16="http://schemas.microsoft.com/office/drawing/2014/main" id="{002A2B31-3A69-4F33-8AFF-3102841393EC}"/>
-              </a:ext>
-            </a:extLst>
-          </p:cNvPr>
-          <p:cNvSpPr/>
-          <p:nvPr/>
-        </p:nvSpPr>
-        <p:spPr>
-          <a:xfrm>
-            <a:off x="2136000" y="3789000"/>
-            <a:ext cx="720000" cy="45719"/>
-          </a:xfrm>
-          <a:prstGeom prst="rect">
-            <a:avLst/>
-          </a:prstGeom>
-        </p:spPr>
-        <p:style>
-          <a:lnRef idx="2">
-            <a:schemeClr val="accent1">
-              <a:shade val="50000"/>
-            </a:schemeClr>
-          </a:lnRef>
-          <a:fillRef idx="1">
-            <a:schemeClr val="accent1"/>
-          </a:fillRef>
-          <a:effectRef idx="0">
-            <a:schemeClr val="accent1"/>
-          </a:effectRef>
-          <a:fontRef idx="minor">
-            <a:schemeClr val="lt1"/>
-          </a:fontRef>
-        </p:style>
-        <p:txBody>
-          <a:bodyPr rtlCol="0" anchor="ctr"/>
-          <a:lstStyle/>
-          <a:p>
-            <a:pPr algn="ctr"/>
-            <a:endParaRPr lang="ko-KR" altLang="en-US"/>
-          </a:p>
-        </p:txBody>
-      </p:sp>
-      <p:sp>
-        <p:nvSpPr>
-          <p:cNvPr id="10" name="직사각형 9">
-            <a:extLst>
-              <a:ext uri="{FF2B5EF4-FFF2-40B4-BE49-F238E27FC236}">
-                <a16:creationId xmlns:a16="http://schemas.microsoft.com/office/drawing/2014/main" id="{CE337292-7681-4C93-803A-6067A07C710F}"/>
-              </a:ext>
-            </a:extLst>
-          </p:cNvPr>
-          <p:cNvSpPr/>
-          <p:nvPr/>
-        </p:nvSpPr>
-        <p:spPr>
-          <a:xfrm>
-            <a:off x="2483942" y="3789000"/>
-            <a:ext cx="45719" cy="405719"/>
-          </a:xfrm>
-          <a:prstGeom prst="rect">
-            <a:avLst/>
-          </a:prstGeom>
-        </p:spPr>
-        <p:style>
-          <a:lnRef idx="2">
-            <a:schemeClr val="accent1">
-              <a:shade val="50000"/>
-            </a:schemeClr>
-          </a:lnRef>
-          <a:fillRef idx="1">
-            <a:schemeClr val="accent1"/>
-          </a:fillRef>
-          <a:effectRef idx="0">
-            <a:schemeClr val="accent1"/>
-          </a:effectRef>
-          <a:fontRef idx="minor">
-            <a:schemeClr val="lt1"/>
-          </a:fontRef>
-        </p:style>
-        <p:txBody>
-          <a:bodyPr rtlCol="0" anchor="ctr"/>
-          <a:lstStyle/>
-          <a:p>
-            <a:pPr algn="ctr"/>
-            <a:endParaRPr lang="ko-KR" altLang="en-US"/>
-          </a:p>
-        </p:txBody>
-      </p:sp>
-      <p:sp>
-        <p:nvSpPr>
-          <p:cNvPr id="11" name="직사각형 10">
-            <a:extLst>
-              <a:ext uri="{FF2B5EF4-FFF2-40B4-BE49-F238E27FC236}">
-                <a16:creationId xmlns:a16="http://schemas.microsoft.com/office/drawing/2014/main" id="{527F600F-A9B9-4CD0-9FC4-AC3D2F3D72E7}"/>
-              </a:ext>
-            </a:extLst>
-          </p:cNvPr>
-          <p:cNvSpPr/>
-          <p:nvPr/>
-        </p:nvSpPr>
-        <p:spPr>
-          <a:xfrm>
-            <a:off x="3216000" y="4126140"/>
-            <a:ext cx="720000" cy="45719"/>
-          </a:xfrm>
-          <a:prstGeom prst="rect">
-            <a:avLst/>
-          </a:prstGeom>
-        </p:spPr>
-        <p:style>
-          <a:lnRef idx="2">
-            <a:schemeClr val="accent1">
-              <a:shade val="50000"/>
-            </a:schemeClr>
-          </a:lnRef>
-          <a:fillRef idx="1">
-            <a:schemeClr val="accent1"/>
-          </a:fillRef>
-          <a:effectRef idx="0">
-            <a:schemeClr val="accent1"/>
-          </a:effectRef>
-          <a:fontRef idx="minor">
-            <a:schemeClr val="lt1"/>
-          </a:fontRef>
-        </p:style>
-        <p:txBody>
-          <a:bodyPr rtlCol="0" anchor="ctr"/>
-          <a:lstStyle/>
-          <a:p>
-            <a:pPr algn="ctr"/>
-            <a:endParaRPr lang="ko-KR" altLang="en-US"/>
-          </a:p>
-        </p:txBody>
-      </p:sp>
-      <p:sp>
-        <p:nvSpPr>
-          <p:cNvPr id="12" name="직사각형 11">
-            <a:extLst>
-              <a:ext uri="{FF2B5EF4-FFF2-40B4-BE49-F238E27FC236}">
-                <a16:creationId xmlns:a16="http://schemas.microsoft.com/office/drawing/2014/main" id="{E8B8DEC1-E579-4857-8F15-1D73AED4E892}"/>
-              </a:ext>
-            </a:extLst>
-          </p:cNvPr>
-          <p:cNvSpPr/>
-          <p:nvPr/>
-        </p:nvSpPr>
-        <p:spPr>
-          <a:xfrm>
-            <a:off x="3597064" y="3766140"/>
-            <a:ext cx="45719" cy="382860"/>
-          </a:xfrm>
-          <a:prstGeom prst="rect">
-            <a:avLst/>
-          </a:prstGeom>
-        </p:spPr>
-        <p:style>
-          <a:lnRef idx="2">
-            <a:schemeClr val="accent1">
-              <a:shade val="50000"/>
-            </a:schemeClr>
-          </a:lnRef>
-          <a:fillRef idx="1">
-            <a:schemeClr val="accent1"/>
-          </a:fillRef>
-          <a:effectRef idx="0">
-            <a:schemeClr val="accent1"/>
-          </a:effectRef>
-          <a:fontRef idx="minor">
-            <a:schemeClr val="lt1"/>
-          </a:fontRef>
-        </p:style>
-        <p:txBody>
-          <a:bodyPr rtlCol="0" anchor="ctr"/>
-          <a:lstStyle/>
-          <a:p>
-            <a:pPr algn="ctr"/>
-            <a:endParaRPr lang="ko-KR" altLang="en-US"/>
-          </a:p>
-        </p:txBody>
-      </p:sp>
-      <p:sp>
-        <p:nvSpPr>
-          <p:cNvPr id="13" name="직사각형 12">
-            <a:extLst>
-              <a:ext uri="{FF2B5EF4-FFF2-40B4-BE49-F238E27FC236}">
-                <a16:creationId xmlns:a16="http://schemas.microsoft.com/office/drawing/2014/main" id="{E379CD3F-0F27-4FFE-9754-56C04192601B}"/>
-              </a:ext>
-            </a:extLst>
-          </p:cNvPr>
-          <p:cNvSpPr/>
-          <p:nvPr/>
-        </p:nvSpPr>
-        <p:spPr>
-          <a:xfrm>
-            <a:off x="3936000" y="3789000"/>
-            <a:ext cx="360000" cy="45719"/>
-          </a:xfrm>
-          <a:prstGeom prst="rect">
-            <a:avLst/>
-          </a:prstGeom>
-        </p:spPr>
-        <p:style>
-          <a:lnRef idx="2">
-            <a:schemeClr val="accent1">
-              <a:shade val="50000"/>
-            </a:schemeClr>
-          </a:lnRef>
-          <a:fillRef idx="1">
-            <a:schemeClr val="accent1"/>
-          </a:fillRef>
-          <a:effectRef idx="0">
-            <a:schemeClr val="accent1"/>
-          </a:effectRef>
-          <a:fontRef idx="minor">
-            <a:schemeClr val="lt1"/>
-          </a:fontRef>
-        </p:style>
-        <p:txBody>
-          <a:bodyPr rtlCol="0" anchor="ctr"/>
-          <a:lstStyle/>
-          <a:p>
-            <a:pPr algn="ctr"/>
-            <a:endParaRPr lang="ko-KR" altLang="en-US"/>
-          </a:p>
-        </p:txBody>
-      </p:sp>
-      <p:sp>
-        <p:nvSpPr>
-          <p:cNvPr id="14" name="직사각형 13">
-            <a:extLst>
-              <a:ext uri="{FF2B5EF4-FFF2-40B4-BE49-F238E27FC236}">
-                <a16:creationId xmlns:a16="http://schemas.microsoft.com/office/drawing/2014/main" id="{08917590-0B1F-42DA-AD7A-29D741D49311}"/>
-              </a:ext>
-            </a:extLst>
-          </p:cNvPr>
-          <p:cNvSpPr/>
-          <p:nvPr/>
-        </p:nvSpPr>
-        <p:spPr>
-          <a:xfrm>
-            <a:off x="691676" y="3789000"/>
-            <a:ext cx="360000" cy="45719"/>
-          </a:xfrm>
-          <a:prstGeom prst="rect">
-            <a:avLst/>
-          </a:prstGeom>
-        </p:spPr>
-        <p:style>
-          <a:lnRef idx="2">
-            <a:schemeClr val="accent1">
-              <a:shade val="50000"/>
-            </a:schemeClr>
-          </a:lnRef>
-          <a:fillRef idx="1">
-            <a:schemeClr val="accent1"/>
-          </a:fillRef>
-          <a:effectRef idx="0">
-            <a:schemeClr val="accent1"/>
-          </a:effectRef>
-          <a:fontRef idx="minor">
-            <a:schemeClr val="lt1"/>
-          </a:fontRef>
-        </p:style>
-        <p:txBody>
-          <a:bodyPr rtlCol="0" anchor="ctr"/>
-          <a:lstStyle/>
-          <a:p>
-            <a:pPr algn="ctr"/>
-            <a:endParaRPr lang="ko-KR" altLang="en-US"/>
-          </a:p>
-        </p:txBody>
-      </p:sp>
-      <p:sp>
-        <p:nvSpPr>
-          <p:cNvPr id="15" name="직사각형 14">
-            <a:extLst>
-              <a:ext uri="{FF2B5EF4-FFF2-40B4-BE49-F238E27FC236}">
-                <a16:creationId xmlns:a16="http://schemas.microsoft.com/office/drawing/2014/main" id="{B2053C42-B92F-419F-9610-0C153612800A}"/>
-              </a:ext>
-            </a:extLst>
-          </p:cNvPr>
-          <p:cNvSpPr/>
-          <p:nvPr/>
-        </p:nvSpPr>
-        <p:spPr>
-          <a:xfrm>
-            <a:off x="1018285" y="3069000"/>
-            <a:ext cx="443973" cy="45719"/>
-          </a:xfrm>
-          <a:prstGeom prst="rect">
-            <a:avLst/>
-          </a:prstGeom>
-        </p:spPr>
-        <p:style>
-          <a:lnRef idx="2">
-            <a:schemeClr val="accent1">
-              <a:shade val="50000"/>
-            </a:schemeClr>
-          </a:lnRef>
-          <a:fillRef idx="1">
-            <a:schemeClr val="accent1"/>
-          </a:fillRef>
-          <a:effectRef idx="0">
-            <a:schemeClr val="accent1"/>
-          </a:effectRef>
-          <a:fontRef idx="minor">
-            <a:schemeClr val="lt1"/>
-          </a:fontRef>
-        </p:style>
-        <p:txBody>
-          <a:bodyPr rtlCol="0" anchor="ctr"/>
-          <a:lstStyle/>
-          <a:p>
-            <a:pPr algn="ctr"/>
-            <a:endParaRPr lang="ko-KR" altLang="en-US"/>
-          </a:p>
-        </p:txBody>
-      </p:sp>
-      <p:sp>
-        <p:nvSpPr>
-          <p:cNvPr id="16" name="직사각형 15">
-            <a:extLst>
-              <a:ext uri="{FF2B5EF4-FFF2-40B4-BE49-F238E27FC236}">
-                <a16:creationId xmlns:a16="http://schemas.microsoft.com/office/drawing/2014/main" id="{841D7576-D55A-4265-AB50-41D3CE586F9F}"/>
-              </a:ext>
-            </a:extLst>
-          </p:cNvPr>
-          <p:cNvSpPr/>
-          <p:nvPr/>
-        </p:nvSpPr>
-        <p:spPr>
-          <a:xfrm>
-            <a:off x="1378285" y="3114719"/>
-            <a:ext cx="83973" cy="360000"/>
-          </a:xfrm>
-          <a:prstGeom prst="rect">
-            <a:avLst/>
-          </a:prstGeom>
-        </p:spPr>
-        <p:style>
-          <a:lnRef idx="2">
-            <a:schemeClr val="accent1">
-              <a:shade val="50000"/>
-            </a:schemeClr>
-          </a:lnRef>
-          <a:fillRef idx="1">
-            <a:schemeClr val="accent1"/>
-          </a:fillRef>
-          <a:effectRef idx="0">
-            <a:schemeClr val="accent1"/>
-          </a:effectRef>
-          <a:fontRef idx="minor">
-            <a:schemeClr val="lt1"/>
-          </a:fontRef>
-        </p:style>
-        <p:txBody>
-          <a:bodyPr rtlCol="0" anchor="ctr"/>
-          <a:lstStyle/>
-          <a:p>
-            <a:pPr algn="ctr"/>
-            <a:endParaRPr lang="ko-KR" altLang="en-US"/>
-          </a:p>
-        </p:txBody>
-      </p:sp>
-      <p:sp>
-        <p:nvSpPr>
-          <p:cNvPr id="17" name="직사각형 16">
-            <a:extLst>
-              <a:ext uri="{FF2B5EF4-FFF2-40B4-BE49-F238E27FC236}">
-                <a16:creationId xmlns:a16="http://schemas.microsoft.com/office/drawing/2014/main" id="{D00593C7-1C6E-45C8-8AA4-4673B44FD233}"/>
-              </a:ext>
-            </a:extLst>
-          </p:cNvPr>
-          <p:cNvSpPr/>
-          <p:nvPr/>
-        </p:nvSpPr>
-        <p:spPr>
-          <a:xfrm>
-            <a:off x="3506486" y="3046140"/>
-            <a:ext cx="443973" cy="45719"/>
-          </a:xfrm>
-          <a:prstGeom prst="rect">
-            <a:avLst/>
-          </a:prstGeom>
-        </p:spPr>
-        <p:style>
-          <a:lnRef idx="2">
-            <a:schemeClr val="accent1">
-              <a:shade val="50000"/>
-            </a:schemeClr>
-          </a:lnRef>
-          <a:fillRef idx="1">
-            <a:schemeClr val="accent1"/>
-          </a:fillRef>
-          <a:effectRef idx="0">
-            <a:schemeClr val="accent1"/>
-          </a:effectRef>
-          <a:fontRef idx="minor">
-            <a:schemeClr val="lt1"/>
-          </a:fontRef>
-        </p:style>
-        <p:txBody>
-          <a:bodyPr rtlCol="0" anchor="ctr"/>
-          <a:lstStyle/>
-          <a:p>
-            <a:pPr algn="ctr"/>
-            <a:endParaRPr lang="ko-KR" altLang="en-US"/>
-          </a:p>
-        </p:txBody>
-      </p:sp>
-      <p:sp>
-        <p:nvSpPr>
-          <p:cNvPr id="18" name="직사각형 17">
-            <a:extLst>
-              <a:ext uri="{FF2B5EF4-FFF2-40B4-BE49-F238E27FC236}">
-                <a16:creationId xmlns:a16="http://schemas.microsoft.com/office/drawing/2014/main" id="{D8BEA381-3C17-496A-8332-2CC72F362A2D}"/>
-              </a:ext>
-            </a:extLst>
-          </p:cNvPr>
-          <p:cNvSpPr/>
-          <p:nvPr/>
-        </p:nvSpPr>
-        <p:spPr>
-          <a:xfrm>
-            <a:off x="3525806" y="3107100"/>
-            <a:ext cx="45719" cy="360000"/>
-          </a:xfrm>
-          <a:prstGeom prst="rect">
-            <a:avLst/>
-          </a:prstGeom>
-        </p:spPr>
-        <p:style>
-          <a:lnRef idx="2">
-            <a:schemeClr val="accent1">
-              <a:shade val="50000"/>
-            </a:schemeClr>
-          </a:lnRef>
-          <a:fillRef idx="1">
-            <a:schemeClr val="accent1"/>
-          </a:fillRef>
-          <a:effectRef idx="0">
-            <a:schemeClr val="accent1"/>
-          </a:effectRef>
-          <a:fontRef idx="minor">
-            <a:schemeClr val="lt1"/>
-          </a:fontRef>
-        </p:style>
-        <p:txBody>
-          <a:bodyPr rtlCol="0" anchor="ctr"/>
-          <a:lstStyle/>
-          <a:p>
-            <a:pPr algn="ctr"/>
-            <a:endParaRPr lang="ko-KR" altLang="en-US"/>
-          </a:p>
-        </p:txBody>
-      </p:sp>
-      <p:sp>
-        <p:nvSpPr>
-          <p:cNvPr id="19" name="직사각형 18">
-            <a:extLst>
-              <a:ext uri="{FF2B5EF4-FFF2-40B4-BE49-F238E27FC236}">
-                <a16:creationId xmlns:a16="http://schemas.microsoft.com/office/drawing/2014/main" id="{09F00E1D-8C9A-448D-97A6-8550660064FC}"/>
-              </a:ext>
-            </a:extLst>
-          </p:cNvPr>
-          <p:cNvSpPr/>
-          <p:nvPr/>
-        </p:nvSpPr>
-        <p:spPr>
-          <a:xfrm>
-            <a:off x="2800847" y="3355865"/>
-            <a:ext cx="443973" cy="45719"/>
-          </a:xfrm>
-          <a:prstGeom prst="rect">
-            <a:avLst/>
-          </a:prstGeom>
-        </p:spPr>
-        <p:style>
-          <a:lnRef idx="2">
-            <a:schemeClr val="accent1">
-              <a:shade val="50000"/>
-            </a:schemeClr>
-          </a:lnRef>
-          <a:fillRef idx="1">
-            <a:schemeClr val="accent1"/>
-          </a:fillRef>
-          <a:effectRef idx="0">
-            <a:schemeClr val="accent1"/>
-          </a:effectRef>
-          <a:fontRef idx="minor">
-            <a:schemeClr val="lt1"/>
-          </a:fontRef>
-        </p:style>
-        <p:txBody>
-          <a:bodyPr rtlCol="0" anchor="ctr"/>
-          <a:lstStyle/>
-          <a:p>
-            <a:pPr algn="ctr"/>
-            <a:endParaRPr lang="ko-KR" altLang="en-US"/>
-          </a:p>
-        </p:txBody>
-      </p:sp>
-      <p:sp>
-        <p:nvSpPr>
-          <p:cNvPr id="20" name="직사각형 19">
-            <a:extLst>
-              <a:ext uri="{FF2B5EF4-FFF2-40B4-BE49-F238E27FC236}">
-                <a16:creationId xmlns:a16="http://schemas.microsoft.com/office/drawing/2014/main" id="{2225FD9B-5DB5-4D39-9892-50D504F62CB0}"/>
-              </a:ext>
-            </a:extLst>
-          </p:cNvPr>
-          <p:cNvSpPr/>
-          <p:nvPr/>
-        </p:nvSpPr>
-        <p:spPr>
-          <a:xfrm>
-            <a:off x="1794319" y="3380766"/>
-            <a:ext cx="443973" cy="45719"/>
-          </a:xfrm>
-          <a:prstGeom prst="rect">
-            <a:avLst/>
-          </a:prstGeom>
-        </p:spPr>
-        <p:style>
-          <a:lnRef idx="2">
-            <a:schemeClr val="accent1">
-              <a:shade val="50000"/>
-            </a:schemeClr>
-          </a:lnRef>
-          <a:fillRef idx="1">
-            <a:schemeClr val="accent1"/>
-          </a:fillRef>
-          <a:effectRef idx="0">
-            <a:schemeClr val="accent1"/>
-          </a:effectRef>
-          <a:fontRef idx="minor">
-            <a:schemeClr val="lt1"/>
-          </a:fontRef>
-        </p:style>
-        <p:txBody>
-          <a:bodyPr rtlCol="0" anchor="ctr"/>
-          <a:lstStyle/>
-          <a:p>
-            <a:pPr algn="ctr"/>
-            <a:endParaRPr lang="ko-KR" altLang="en-US"/>
-          </a:p>
-        </p:txBody>
-      </p:sp>
-      <p:sp>
-        <p:nvSpPr>
-          <p:cNvPr id="21" name="직사각형 20">
-            <a:extLst>
-              <a:ext uri="{FF2B5EF4-FFF2-40B4-BE49-F238E27FC236}">
-                <a16:creationId xmlns:a16="http://schemas.microsoft.com/office/drawing/2014/main" id="{20B05898-B0B6-48F8-B07A-BABC2E3722F3}"/>
-              </a:ext>
-            </a:extLst>
-          </p:cNvPr>
-          <p:cNvSpPr/>
-          <p:nvPr/>
-        </p:nvSpPr>
-        <p:spPr>
-          <a:xfrm>
-            <a:off x="2474143" y="3036847"/>
-            <a:ext cx="45719" cy="430253"/>
-          </a:xfrm>
-          <a:prstGeom prst="rect">
-            <a:avLst/>
-          </a:prstGeom>
-        </p:spPr>
-        <p:style>
-          <a:lnRef idx="2">
-            <a:schemeClr val="accent1">
-              <a:shade val="50000"/>
-            </a:schemeClr>
-          </a:lnRef>
-          <a:fillRef idx="1">
-            <a:schemeClr val="accent1"/>
-          </a:fillRef>
-          <a:effectRef idx="0">
-            <a:schemeClr val="accent1"/>
-          </a:effectRef>
-          <a:fontRef idx="minor">
-            <a:schemeClr val="lt1"/>
-          </a:fontRef>
-        </p:style>
-        <p:txBody>
-          <a:bodyPr rtlCol="0" anchor="ctr"/>
-          <a:lstStyle/>
-          <a:p>
-            <a:pPr algn="ctr"/>
-            <a:endParaRPr lang="ko-KR" altLang="en-US"/>
-          </a:p>
-        </p:txBody>
-      </p:sp>
-      <p:sp>
-        <p:nvSpPr>
-          <p:cNvPr id="22" name="직사각형 21">
-            <a:extLst>
-              <a:ext uri="{FF2B5EF4-FFF2-40B4-BE49-F238E27FC236}">
-                <a16:creationId xmlns:a16="http://schemas.microsoft.com/office/drawing/2014/main" id="{FAB4A78A-CAC6-4E0F-B38B-B70F0073A0BE}"/>
-              </a:ext>
-            </a:extLst>
-          </p:cNvPr>
-          <p:cNvSpPr/>
-          <p:nvPr/>
-        </p:nvSpPr>
-        <p:spPr>
-          <a:xfrm>
-            <a:off x="2107782" y="3002463"/>
-            <a:ext cx="752320" cy="45719"/>
-          </a:xfrm>
-          <a:prstGeom prst="rect">
-            <a:avLst/>
-          </a:prstGeom>
-        </p:spPr>
-        <p:style>
-          <a:lnRef idx="2">
-            <a:schemeClr val="accent1">
-              <a:shade val="50000"/>
-            </a:schemeClr>
-          </a:lnRef>
-          <a:fillRef idx="1">
-            <a:schemeClr val="accent1"/>
-          </a:fillRef>
-          <a:effectRef idx="0">
-            <a:schemeClr val="accent1"/>
-          </a:effectRef>
-          <a:fontRef idx="minor">
-            <a:schemeClr val="lt1"/>
-          </a:fontRef>
-        </p:style>
-        <p:txBody>
-          <a:bodyPr rtlCol="0" anchor="ctr"/>
-          <a:lstStyle/>
-          <a:p>
-            <a:pPr algn="ctr"/>
-            <a:endParaRPr lang="ko-KR" altLang="en-US"/>
-          </a:p>
-        </p:txBody>
-      </p:sp>
-      <p:sp>
-        <p:nvSpPr>
-          <p:cNvPr id="23" name="직사각형 22">
-            <a:extLst>
-              <a:ext uri="{FF2B5EF4-FFF2-40B4-BE49-F238E27FC236}">
-                <a16:creationId xmlns:a16="http://schemas.microsoft.com/office/drawing/2014/main" id="{AC4DCF54-4FFB-48DE-A188-FA4967E9BEC7}"/>
-              </a:ext>
-            </a:extLst>
-          </p:cNvPr>
-          <p:cNvSpPr/>
-          <p:nvPr/>
-        </p:nvSpPr>
-        <p:spPr>
-          <a:xfrm>
-            <a:off x="2109833" y="2362932"/>
-            <a:ext cx="748218" cy="386761"/>
-          </a:xfrm>
-          <a:prstGeom prst="rect">
-            <a:avLst/>
-          </a:prstGeom>
-          <a:noFill/>
-          <a:ln w="28575">
-            <a:solidFill>
-              <a:schemeClr val="tx1"/>
-            </a:solidFill>
-          </a:ln>
-        </p:spPr>
-        <p:style>
-          <a:lnRef idx="2">
-            <a:schemeClr val="accent1">
-              <a:shade val="50000"/>
-            </a:schemeClr>
-          </a:lnRef>
-          <a:fillRef idx="1">
-            <a:schemeClr val="accent1"/>
-          </a:fillRef>
-          <a:effectRef idx="0">
-            <a:schemeClr val="accent1"/>
-          </a:effectRef>
-          <a:fontRef idx="minor">
-            <a:schemeClr val="lt1"/>
-          </a:fontRef>
-        </p:style>
-        <p:txBody>
-          <a:bodyPr rtlCol="0" anchor="ctr"/>
-          <a:lstStyle/>
-          <a:p>
-            <a:pPr algn="ctr"/>
-            <a:endParaRPr lang="ko-KR" altLang="en-US"/>
-          </a:p>
-        </p:txBody>
-      </p:sp>
-      <p:sp>
-        <p:nvSpPr>
-          <p:cNvPr id="24" name="직사각형 23">
-            <a:extLst>
-              <a:ext uri="{FF2B5EF4-FFF2-40B4-BE49-F238E27FC236}">
-                <a16:creationId xmlns:a16="http://schemas.microsoft.com/office/drawing/2014/main" id="{92A276A7-8E0F-4616-AB88-9EB0A9A298D6}"/>
-              </a:ext>
-            </a:extLst>
-          </p:cNvPr>
-          <p:cNvSpPr/>
-          <p:nvPr/>
-        </p:nvSpPr>
-        <p:spPr>
-          <a:xfrm>
-            <a:off x="1378285" y="1629000"/>
-            <a:ext cx="45719" cy="1080000"/>
-          </a:xfrm>
-          <a:prstGeom prst="rect">
-            <a:avLst/>
-          </a:prstGeom>
-        </p:spPr>
-        <p:style>
-          <a:lnRef idx="2">
-            <a:schemeClr val="accent1">
-              <a:shade val="50000"/>
-            </a:schemeClr>
-          </a:lnRef>
-          <a:fillRef idx="1">
-            <a:schemeClr val="accent1"/>
-          </a:fillRef>
-          <a:effectRef idx="0">
-            <a:schemeClr val="accent1"/>
-          </a:effectRef>
-          <a:fontRef idx="minor">
-            <a:schemeClr val="lt1"/>
-          </a:fontRef>
-        </p:style>
-        <p:txBody>
-          <a:bodyPr rtlCol="0" anchor="ctr"/>
-          <a:lstStyle/>
-          <a:p>
-            <a:pPr algn="ctr"/>
-            <a:endParaRPr lang="ko-KR" altLang="en-US"/>
-          </a:p>
-        </p:txBody>
-      </p:sp>
-      <p:sp>
-        <p:nvSpPr>
-          <p:cNvPr id="25" name="직사각형 24">
-            <a:extLst>
-              <a:ext uri="{FF2B5EF4-FFF2-40B4-BE49-F238E27FC236}">
-                <a16:creationId xmlns:a16="http://schemas.microsoft.com/office/drawing/2014/main" id="{7A311AD0-4C14-4E0B-B9B2-7F2D496B72D8}"/>
-              </a:ext>
-            </a:extLst>
-          </p:cNvPr>
-          <p:cNvSpPr/>
-          <p:nvPr/>
-        </p:nvSpPr>
-        <p:spPr>
-          <a:xfrm>
-            <a:off x="1401144" y="2349000"/>
-            <a:ext cx="383399" cy="45719"/>
-          </a:xfrm>
-          <a:prstGeom prst="rect">
-            <a:avLst/>
-          </a:prstGeom>
-        </p:spPr>
-        <p:style>
-          <a:lnRef idx="2">
-            <a:schemeClr val="accent1">
-              <a:shade val="50000"/>
-            </a:schemeClr>
-          </a:lnRef>
-          <a:fillRef idx="1">
-            <a:schemeClr val="accent1"/>
-          </a:fillRef>
-          <a:effectRef idx="0">
-            <a:schemeClr val="accent1"/>
-          </a:effectRef>
-          <a:fontRef idx="minor">
-            <a:schemeClr val="lt1"/>
-          </a:fontRef>
-        </p:style>
-        <p:txBody>
-          <a:bodyPr rtlCol="0" anchor="ctr"/>
-          <a:lstStyle/>
-          <a:p>
-            <a:pPr algn="ctr"/>
-            <a:endParaRPr lang="ko-KR" altLang="en-US"/>
-          </a:p>
-        </p:txBody>
-      </p:sp>
-      <p:sp>
-        <p:nvSpPr>
-          <p:cNvPr id="26" name="직사각형 25">
-            <a:extLst>
-              <a:ext uri="{FF2B5EF4-FFF2-40B4-BE49-F238E27FC236}">
-                <a16:creationId xmlns:a16="http://schemas.microsoft.com/office/drawing/2014/main" id="{445F2D96-E908-49D3-8113-205D0BCD0879}"/>
-              </a:ext>
-            </a:extLst>
-          </p:cNvPr>
-          <p:cNvSpPr/>
-          <p:nvPr/>
-        </p:nvSpPr>
-        <p:spPr>
-          <a:xfrm>
-            <a:off x="1784543" y="1989000"/>
-            <a:ext cx="359461" cy="45719"/>
-          </a:xfrm>
-          <a:prstGeom prst="rect">
-            <a:avLst/>
-          </a:prstGeom>
-        </p:spPr>
-        <p:style>
-          <a:lnRef idx="2">
-            <a:schemeClr val="accent1">
-              <a:shade val="50000"/>
-            </a:schemeClr>
-          </a:lnRef>
-          <a:fillRef idx="1">
-            <a:schemeClr val="accent1"/>
-          </a:fillRef>
-          <a:effectRef idx="0">
-            <a:schemeClr val="accent1"/>
-          </a:effectRef>
-          <a:fontRef idx="minor">
-            <a:schemeClr val="lt1"/>
-          </a:fontRef>
-        </p:style>
-        <p:txBody>
-          <a:bodyPr rtlCol="0" anchor="ctr"/>
-          <a:lstStyle/>
-          <a:p>
-            <a:pPr algn="ctr"/>
-            <a:endParaRPr lang="ko-KR" altLang="en-US"/>
-          </a:p>
-        </p:txBody>
-      </p:sp>
-      <p:sp>
-        <p:nvSpPr>
-          <p:cNvPr id="28" name="직사각형 27">
-            <a:extLst>
-              <a:ext uri="{FF2B5EF4-FFF2-40B4-BE49-F238E27FC236}">
-                <a16:creationId xmlns:a16="http://schemas.microsoft.com/office/drawing/2014/main" id="{AAD24095-7DB5-4853-82FB-689678124447}"/>
-              </a:ext>
-            </a:extLst>
-          </p:cNvPr>
-          <p:cNvSpPr/>
-          <p:nvPr/>
-        </p:nvSpPr>
-        <p:spPr>
-          <a:xfrm>
-            <a:off x="3550409" y="1629000"/>
-            <a:ext cx="45719" cy="1080000"/>
-          </a:xfrm>
-          <a:prstGeom prst="rect">
-            <a:avLst/>
-          </a:prstGeom>
-        </p:spPr>
-        <p:style>
-          <a:lnRef idx="2">
-            <a:schemeClr val="accent1">
-              <a:shade val="50000"/>
-            </a:schemeClr>
-          </a:lnRef>
-          <a:fillRef idx="1">
-            <a:schemeClr val="accent1"/>
-          </a:fillRef>
-          <a:effectRef idx="0">
-            <a:schemeClr val="accent1"/>
-          </a:effectRef>
-          <a:fontRef idx="minor">
-            <a:schemeClr val="lt1"/>
-          </a:fontRef>
-        </p:style>
-        <p:txBody>
-          <a:bodyPr rtlCol="0" anchor="ctr"/>
-          <a:lstStyle/>
-          <a:p>
-            <a:pPr algn="ctr"/>
-            <a:endParaRPr lang="ko-KR" altLang="en-US"/>
-          </a:p>
-        </p:txBody>
-      </p:sp>
-      <p:sp>
-        <p:nvSpPr>
-          <p:cNvPr id="29" name="직사각형 28">
-            <a:extLst>
-              <a:ext uri="{FF2B5EF4-FFF2-40B4-BE49-F238E27FC236}">
-                <a16:creationId xmlns:a16="http://schemas.microsoft.com/office/drawing/2014/main" id="{DBFD871B-2022-4D69-84C6-C4B2196C3EE4}"/>
-              </a:ext>
-            </a:extLst>
-          </p:cNvPr>
-          <p:cNvSpPr/>
-          <p:nvPr/>
-        </p:nvSpPr>
-        <p:spPr>
-          <a:xfrm>
-            <a:off x="3207921" y="2362932"/>
-            <a:ext cx="359461" cy="45719"/>
-          </a:xfrm>
-          <a:prstGeom prst="rect">
-            <a:avLst/>
-          </a:prstGeom>
-        </p:spPr>
-        <p:style>
-          <a:lnRef idx="2">
-            <a:schemeClr val="accent1">
-              <a:shade val="50000"/>
-            </a:schemeClr>
-          </a:lnRef>
-          <a:fillRef idx="1">
-            <a:schemeClr val="accent1"/>
-          </a:fillRef>
-          <a:effectRef idx="0">
-            <a:schemeClr val="accent1"/>
-          </a:effectRef>
-          <a:fontRef idx="minor">
-            <a:schemeClr val="lt1"/>
-          </a:fontRef>
-        </p:style>
-        <p:txBody>
-          <a:bodyPr rtlCol="0" anchor="ctr"/>
-          <a:lstStyle/>
-          <a:p>
-            <a:pPr algn="ctr"/>
-            <a:endParaRPr lang="ko-KR" altLang="en-US"/>
-          </a:p>
-        </p:txBody>
-      </p:sp>
-      <p:sp>
-        <p:nvSpPr>
-          <p:cNvPr id="30" name="직사각형 29">
-            <a:extLst>
-              <a:ext uri="{FF2B5EF4-FFF2-40B4-BE49-F238E27FC236}">
-                <a16:creationId xmlns:a16="http://schemas.microsoft.com/office/drawing/2014/main" id="{F543F469-E2C1-44E7-9922-D19CF44465E4}"/>
-              </a:ext>
-            </a:extLst>
-          </p:cNvPr>
-          <p:cNvSpPr/>
-          <p:nvPr/>
-        </p:nvSpPr>
-        <p:spPr>
-          <a:xfrm>
-            <a:off x="2839974" y="1966140"/>
-            <a:ext cx="359461" cy="45719"/>
-          </a:xfrm>
-          <a:prstGeom prst="rect">
-            <a:avLst/>
-          </a:prstGeom>
-        </p:spPr>
-        <p:style>
-          <a:lnRef idx="2">
-            <a:schemeClr val="accent1">
-              <a:shade val="50000"/>
-            </a:schemeClr>
-          </a:lnRef>
-          <a:fillRef idx="1">
-            <a:schemeClr val="accent1"/>
-          </a:fillRef>
-          <a:effectRef idx="0">
-            <a:schemeClr val="accent1"/>
-          </a:effectRef>
-          <a:fontRef idx="minor">
-            <a:schemeClr val="lt1"/>
-          </a:fontRef>
-        </p:style>
-        <p:txBody>
-          <a:bodyPr rtlCol="0" anchor="ctr"/>
-          <a:lstStyle/>
-          <a:p>
-            <a:pPr algn="ctr"/>
-            <a:endParaRPr lang="ko-KR" altLang="en-US"/>
-          </a:p>
-        </p:txBody>
-      </p:sp>
-      <p:sp>
-        <p:nvSpPr>
-          <p:cNvPr id="31" name="직사각형 30">
-            <a:extLst>
-              <a:ext uri="{FF2B5EF4-FFF2-40B4-BE49-F238E27FC236}">
-                <a16:creationId xmlns:a16="http://schemas.microsoft.com/office/drawing/2014/main" id="{E3AFC922-E525-4B92-9D2C-E866FBCD64A0}"/>
-              </a:ext>
-            </a:extLst>
-          </p:cNvPr>
-          <p:cNvSpPr/>
-          <p:nvPr/>
-        </p:nvSpPr>
-        <p:spPr>
-          <a:xfrm>
-            <a:off x="710922" y="2689475"/>
-            <a:ext cx="359461" cy="45719"/>
-          </a:xfrm>
-          <a:prstGeom prst="rect">
-            <a:avLst/>
-          </a:prstGeom>
-        </p:spPr>
-        <p:style>
-          <a:lnRef idx="2">
-            <a:schemeClr val="accent1">
-              <a:shade val="50000"/>
-            </a:schemeClr>
-          </a:lnRef>
-          <a:fillRef idx="1">
-            <a:schemeClr val="accent1"/>
-          </a:fillRef>
-          <a:effectRef idx="0">
-            <a:schemeClr val="accent1"/>
-          </a:effectRef>
-          <a:fontRef idx="minor">
-            <a:schemeClr val="lt1"/>
-          </a:fontRef>
-        </p:style>
-        <p:txBody>
-          <a:bodyPr rtlCol="0" anchor="ctr"/>
-          <a:lstStyle/>
-          <a:p>
-            <a:pPr algn="ctr"/>
-            <a:endParaRPr lang="ko-KR" altLang="en-US"/>
-          </a:p>
-        </p:txBody>
-      </p:sp>
-      <p:sp>
-        <p:nvSpPr>
-          <p:cNvPr id="32" name="직사각형 31">
-            <a:extLst>
-              <a:ext uri="{FF2B5EF4-FFF2-40B4-BE49-F238E27FC236}">
-                <a16:creationId xmlns:a16="http://schemas.microsoft.com/office/drawing/2014/main" id="{45F56B0E-C4BA-4583-8147-336D9F2E5179}"/>
-              </a:ext>
-            </a:extLst>
-          </p:cNvPr>
-          <p:cNvSpPr/>
-          <p:nvPr/>
-        </p:nvSpPr>
-        <p:spPr>
-          <a:xfrm>
-            <a:off x="3904030" y="2704536"/>
-            <a:ext cx="359461" cy="45719"/>
-          </a:xfrm>
-          <a:prstGeom prst="rect">
-            <a:avLst/>
-          </a:prstGeom>
-        </p:spPr>
-        <p:style>
-          <a:lnRef idx="2">
-            <a:schemeClr val="accent1">
-              <a:shade val="50000"/>
-            </a:schemeClr>
-          </a:lnRef>
-          <a:fillRef idx="1">
-            <a:schemeClr val="accent1"/>
-          </a:fillRef>
-          <a:effectRef idx="0">
-            <a:schemeClr val="accent1"/>
-          </a:effectRef>
-          <a:fontRef idx="minor">
-            <a:schemeClr val="lt1"/>
-          </a:fontRef>
-        </p:style>
-        <p:txBody>
-          <a:bodyPr rtlCol="0" anchor="ctr"/>
-          <a:lstStyle/>
-          <a:p>
-            <a:pPr algn="ctr"/>
-            <a:endParaRPr lang="ko-KR" altLang="en-US"/>
-          </a:p>
-        </p:txBody>
-      </p:sp>
-      <p:sp>
-        <p:nvSpPr>
-          <p:cNvPr id="35" name="직사각형 34">
-            <a:extLst>
-              <a:ext uri="{FF2B5EF4-FFF2-40B4-BE49-F238E27FC236}">
-                <a16:creationId xmlns:a16="http://schemas.microsoft.com/office/drawing/2014/main" id="{72B04D4E-4BBE-40D1-957B-3A5212ABA51B}"/>
-              </a:ext>
-            </a:extLst>
-          </p:cNvPr>
-          <p:cNvSpPr/>
-          <p:nvPr/>
-        </p:nvSpPr>
-        <p:spPr>
-          <a:xfrm>
-            <a:off x="1033418" y="2355669"/>
-            <a:ext cx="359461" cy="45719"/>
-          </a:xfrm>
-          <a:prstGeom prst="rect">
-            <a:avLst/>
-          </a:prstGeom>
-        </p:spPr>
-        <p:style>
-          <a:lnRef idx="2">
-            <a:schemeClr val="accent1">
-              <a:shade val="50000"/>
-            </a:schemeClr>
-          </a:lnRef>
-          <a:fillRef idx="1">
-            <a:schemeClr val="accent1"/>
-          </a:fillRef>
-          <a:effectRef idx="0">
-            <a:schemeClr val="accent1"/>
-          </a:effectRef>
-          <a:fontRef idx="minor">
-            <a:schemeClr val="lt1"/>
-          </a:fontRef>
-        </p:style>
-        <p:txBody>
-          <a:bodyPr rtlCol="0" anchor="ctr"/>
-          <a:lstStyle/>
-          <a:p>
-            <a:pPr algn="ctr"/>
-            <a:endParaRPr lang="ko-KR" altLang="en-US"/>
-          </a:p>
-        </p:txBody>
-      </p:sp>
-      <p:sp>
-        <p:nvSpPr>
-          <p:cNvPr id="36" name="직사각형 35">
-            <a:extLst>
-              <a:ext uri="{FF2B5EF4-FFF2-40B4-BE49-F238E27FC236}">
-                <a16:creationId xmlns:a16="http://schemas.microsoft.com/office/drawing/2014/main" id="{9CEFA349-6DA4-44C9-8F9A-8A207939BEAB}"/>
-              </a:ext>
-            </a:extLst>
-          </p:cNvPr>
-          <p:cNvSpPr/>
-          <p:nvPr/>
-        </p:nvSpPr>
-        <p:spPr>
-          <a:xfrm>
-            <a:off x="3596128" y="2362159"/>
-            <a:ext cx="359461" cy="45719"/>
-          </a:xfrm>
-          <a:prstGeom prst="rect">
-            <a:avLst/>
-          </a:prstGeom>
-        </p:spPr>
-        <p:style>
-          <a:lnRef idx="2">
-            <a:schemeClr val="accent1">
-              <a:shade val="50000"/>
-            </a:schemeClr>
-          </a:lnRef>
-          <a:fillRef idx="1">
-            <a:schemeClr val="accent1"/>
-          </a:fillRef>
-          <a:effectRef idx="0">
-            <a:schemeClr val="accent1"/>
-          </a:effectRef>
-          <a:fontRef idx="minor">
-            <a:schemeClr val="lt1"/>
-          </a:fontRef>
-        </p:style>
-        <p:txBody>
-          <a:bodyPr rtlCol="0" anchor="ctr"/>
-          <a:lstStyle/>
-          <a:p>
-            <a:pPr algn="ctr"/>
-            <a:endParaRPr lang="ko-KR" altLang="en-US"/>
-          </a:p>
-        </p:txBody>
-      </p:sp>
-      <p:sp>
-        <p:nvSpPr>
-          <p:cNvPr id="37" name="직사각형 36">
-            <a:extLst>
-              <a:ext uri="{FF2B5EF4-FFF2-40B4-BE49-F238E27FC236}">
-                <a16:creationId xmlns:a16="http://schemas.microsoft.com/office/drawing/2014/main" id="{605062B5-6CB2-43F9-B7FC-E9A3F752E237}"/>
-              </a:ext>
-            </a:extLst>
-          </p:cNvPr>
-          <p:cNvSpPr/>
-          <p:nvPr/>
-        </p:nvSpPr>
-        <p:spPr>
-          <a:xfrm>
-            <a:off x="692215" y="1976906"/>
-            <a:ext cx="359461" cy="45719"/>
-          </a:xfrm>
-          <a:prstGeom prst="rect">
-            <a:avLst/>
-          </a:prstGeom>
-        </p:spPr>
-        <p:style>
-          <a:lnRef idx="2">
-            <a:schemeClr val="accent1">
-              <a:shade val="50000"/>
-            </a:schemeClr>
-          </a:lnRef>
-          <a:fillRef idx="1">
-            <a:schemeClr val="accent1"/>
-          </a:fillRef>
-          <a:effectRef idx="0">
-            <a:schemeClr val="accent1"/>
-          </a:effectRef>
-          <a:fontRef idx="minor">
-            <a:schemeClr val="lt1"/>
-          </a:fontRef>
-        </p:style>
-        <p:txBody>
-          <a:bodyPr rtlCol="0" anchor="ctr"/>
-          <a:lstStyle/>
-          <a:p>
-            <a:pPr algn="ctr"/>
-            <a:endParaRPr lang="ko-KR" altLang="en-US"/>
-          </a:p>
-        </p:txBody>
-      </p:sp>
-      <p:sp>
-        <p:nvSpPr>
-          <p:cNvPr id="38" name="직사각형 37">
-            <a:extLst>
-              <a:ext uri="{FF2B5EF4-FFF2-40B4-BE49-F238E27FC236}">
-                <a16:creationId xmlns:a16="http://schemas.microsoft.com/office/drawing/2014/main" id="{FA01D0D4-5FBD-4307-8582-5697045CA15D}"/>
-              </a:ext>
-            </a:extLst>
-          </p:cNvPr>
-          <p:cNvSpPr/>
-          <p:nvPr/>
-        </p:nvSpPr>
-        <p:spPr>
-          <a:xfrm>
-            <a:off x="3923987" y="1949860"/>
-            <a:ext cx="359461" cy="45719"/>
-          </a:xfrm>
-          <a:prstGeom prst="rect">
-            <a:avLst/>
-          </a:prstGeom>
-        </p:spPr>
-        <p:style>
-          <a:lnRef idx="2">
-            <a:schemeClr val="accent1">
-              <a:shade val="50000"/>
-            </a:schemeClr>
-          </a:lnRef>
-          <a:fillRef idx="1">
-            <a:schemeClr val="accent1"/>
-          </a:fillRef>
-          <a:effectRef idx="0">
-            <a:schemeClr val="accent1"/>
-          </a:effectRef>
-          <a:fontRef idx="minor">
-            <a:schemeClr val="lt1"/>
-          </a:fontRef>
-        </p:style>
-        <p:txBody>
-          <a:bodyPr rtlCol="0" anchor="ctr"/>
-          <a:lstStyle/>
-          <a:p>
-            <a:pPr algn="ctr"/>
-            <a:endParaRPr lang="ko-KR" altLang="en-US"/>
-          </a:p>
-        </p:txBody>
-      </p:sp>
-      <p:sp>
-        <p:nvSpPr>
-          <p:cNvPr id="39" name="직사각형 38">
-            <a:extLst>
-              <a:ext uri="{FF2B5EF4-FFF2-40B4-BE49-F238E27FC236}">
-                <a16:creationId xmlns:a16="http://schemas.microsoft.com/office/drawing/2014/main" id="{2BB86C16-D8E8-4ACC-831F-DDE9227FC3FD}"/>
-              </a:ext>
-            </a:extLst>
-          </p:cNvPr>
-          <p:cNvSpPr/>
-          <p:nvPr/>
-        </p:nvSpPr>
-        <p:spPr>
-          <a:xfrm>
-            <a:off x="2132240" y="1608182"/>
-            <a:ext cx="757650" cy="66537"/>
-          </a:xfrm>
-          <a:prstGeom prst="rect">
-            <a:avLst/>
-          </a:prstGeom>
-        </p:spPr>
-        <p:style>
-          <a:lnRef idx="2">
-            <a:schemeClr val="accent1">
-              <a:shade val="50000"/>
-            </a:schemeClr>
-          </a:lnRef>
-          <a:fillRef idx="1">
-            <a:schemeClr val="accent1"/>
-          </a:fillRef>
-          <a:effectRef idx="0">
-            <a:schemeClr val="accent1"/>
-          </a:effectRef>
-          <a:fontRef idx="minor">
-            <a:schemeClr val="lt1"/>
-          </a:fontRef>
-        </p:style>
-        <p:txBody>
-          <a:bodyPr rtlCol="0" anchor="ctr"/>
-          <a:lstStyle/>
-          <a:p>
-            <a:pPr algn="ctr"/>
-            <a:endParaRPr lang="ko-KR" altLang="en-US"/>
-          </a:p>
-        </p:txBody>
-      </p:sp>
-      <p:sp>
-        <p:nvSpPr>
-          <p:cNvPr id="40" name="직사각형 39">
-            <a:extLst>
-              <a:ext uri="{FF2B5EF4-FFF2-40B4-BE49-F238E27FC236}">
-                <a16:creationId xmlns:a16="http://schemas.microsoft.com/office/drawing/2014/main" id="{F9604910-24CC-43EC-97AD-15CA644576A1}"/>
-              </a:ext>
-            </a:extLst>
-          </p:cNvPr>
-          <p:cNvSpPr/>
-          <p:nvPr/>
-        </p:nvSpPr>
-        <p:spPr>
-          <a:xfrm>
-            <a:off x="2497002" y="1680286"/>
-            <a:ext cx="45719" cy="360000"/>
-          </a:xfrm>
-          <a:prstGeom prst="rect">
-            <a:avLst/>
-          </a:prstGeom>
-        </p:spPr>
-        <p:style>
-          <a:lnRef idx="2">
-            <a:schemeClr val="accent1">
-              <a:shade val="50000"/>
-            </a:schemeClr>
-          </a:lnRef>
-          <a:fillRef idx="1">
-            <a:schemeClr val="accent1"/>
-          </a:fillRef>
-          <a:effectRef idx="0">
-            <a:schemeClr val="accent1"/>
-          </a:effectRef>
-          <a:fontRef idx="minor">
-            <a:schemeClr val="lt1"/>
-          </a:fontRef>
-        </p:style>
-        <p:txBody>
-          <a:bodyPr rtlCol="0" anchor="ctr"/>
-          <a:lstStyle/>
-          <a:p>
-            <a:pPr algn="ctr"/>
-            <a:endParaRPr lang="ko-KR" altLang="en-US"/>
-          </a:p>
-        </p:txBody>
-      </p:sp>
-      <p:sp>
-        <p:nvSpPr>
-          <p:cNvPr id="41" name="직사각형 40">
-            <a:extLst>
-              <a:ext uri="{FF2B5EF4-FFF2-40B4-BE49-F238E27FC236}">
-                <a16:creationId xmlns:a16="http://schemas.microsoft.com/office/drawing/2014/main" id="{2D7B5E93-405A-4792-9411-5CEE55797944}"/>
-              </a:ext>
-            </a:extLst>
-          </p:cNvPr>
-          <p:cNvSpPr/>
-          <p:nvPr/>
-        </p:nvSpPr>
-        <p:spPr>
-          <a:xfrm>
-            <a:off x="1384969" y="1233962"/>
-            <a:ext cx="757650" cy="66537"/>
-          </a:xfrm>
-          <a:prstGeom prst="rect">
-            <a:avLst/>
-          </a:prstGeom>
-        </p:spPr>
-        <p:style>
-          <a:lnRef idx="2">
-            <a:schemeClr val="accent1">
-              <a:shade val="50000"/>
-            </a:schemeClr>
-          </a:lnRef>
-          <a:fillRef idx="1">
-            <a:schemeClr val="accent1"/>
-          </a:fillRef>
-          <a:effectRef idx="0">
-            <a:schemeClr val="accent1"/>
-          </a:effectRef>
-          <a:fontRef idx="minor">
-            <a:schemeClr val="lt1"/>
-          </a:fontRef>
-        </p:style>
-        <p:txBody>
-          <a:bodyPr rtlCol="0" anchor="ctr"/>
-          <a:lstStyle/>
-          <a:p>
-            <a:pPr algn="ctr"/>
-            <a:endParaRPr lang="ko-KR" altLang="en-US"/>
-          </a:p>
-        </p:txBody>
-      </p:sp>
-      <p:sp>
-        <p:nvSpPr>
-          <p:cNvPr id="42" name="직사각형 41">
-            <a:extLst>
-              <a:ext uri="{FF2B5EF4-FFF2-40B4-BE49-F238E27FC236}">
-                <a16:creationId xmlns:a16="http://schemas.microsoft.com/office/drawing/2014/main" id="{78E5B586-6FC5-4AE6-93E5-AACE32AE866F}"/>
-              </a:ext>
-            </a:extLst>
-          </p:cNvPr>
-          <p:cNvSpPr/>
-          <p:nvPr/>
-        </p:nvSpPr>
-        <p:spPr>
-          <a:xfrm>
-            <a:off x="1749731" y="1306066"/>
-            <a:ext cx="45719" cy="360000"/>
-          </a:xfrm>
-          <a:prstGeom prst="rect">
-            <a:avLst/>
-          </a:prstGeom>
-        </p:spPr>
-        <p:style>
-          <a:lnRef idx="2">
-            <a:schemeClr val="accent1">
-              <a:shade val="50000"/>
-            </a:schemeClr>
-          </a:lnRef>
-          <a:fillRef idx="1">
-            <a:schemeClr val="accent1"/>
-          </a:fillRef>
-          <a:effectRef idx="0">
-            <a:schemeClr val="accent1"/>
-          </a:effectRef>
-          <a:fontRef idx="minor">
-            <a:schemeClr val="lt1"/>
-          </a:fontRef>
-        </p:style>
-        <p:txBody>
-          <a:bodyPr rtlCol="0" anchor="ctr"/>
-          <a:lstStyle/>
-          <a:p>
-            <a:pPr algn="ctr"/>
-            <a:endParaRPr lang="ko-KR" altLang="en-US"/>
-          </a:p>
-        </p:txBody>
-      </p:sp>
-      <p:sp>
-        <p:nvSpPr>
-          <p:cNvPr id="43" name="직사각형 42">
-            <a:extLst>
-              <a:ext uri="{FF2B5EF4-FFF2-40B4-BE49-F238E27FC236}">
-                <a16:creationId xmlns:a16="http://schemas.microsoft.com/office/drawing/2014/main" id="{0ED9D002-D32B-42EB-A053-8C3EA5238CBD}"/>
-              </a:ext>
-            </a:extLst>
-          </p:cNvPr>
-          <p:cNvSpPr/>
-          <p:nvPr/>
-        </p:nvSpPr>
-        <p:spPr>
-          <a:xfrm>
-            <a:off x="2840040" y="1225563"/>
-            <a:ext cx="757650" cy="66537"/>
-          </a:xfrm>
-          <a:prstGeom prst="rect">
-            <a:avLst/>
-          </a:prstGeom>
-        </p:spPr>
-        <p:style>
-          <a:lnRef idx="2">
-            <a:schemeClr val="accent1">
-              <a:shade val="50000"/>
-            </a:schemeClr>
-          </a:lnRef>
-          <a:fillRef idx="1">
-            <a:schemeClr val="accent1"/>
-          </a:fillRef>
-          <a:effectRef idx="0">
-            <a:schemeClr val="accent1"/>
-          </a:effectRef>
-          <a:fontRef idx="minor">
-            <a:schemeClr val="lt1"/>
-          </a:fontRef>
-        </p:style>
-        <p:txBody>
-          <a:bodyPr rtlCol="0" anchor="ctr"/>
-          <a:lstStyle/>
-          <a:p>
-            <a:pPr algn="ctr"/>
-            <a:endParaRPr lang="ko-KR" altLang="en-US"/>
-          </a:p>
-        </p:txBody>
-      </p:sp>
-      <p:sp>
-        <p:nvSpPr>
-          <p:cNvPr id="44" name="직사각형 43">
-            <a:extLst>
-              <a:ext uri="{FF2B5EF4-FFF2-40B4-BE49-F238E27FC236}">
-                <a16:creationId xmlns:a16="http://schemas.microsoft.com/office/drawing/2014/main" id="{379F5A92-D5A4-4597-8069-CF4A75B5865B}"/>
-              </a:ext>
-            </a:extLst>
-          </p:cNvPr>
-          <p:cNvSpPr/>
-          <p:nvPr/>
-        </p:nvSpPr>
-        <p:spPr>
-          <a:xfrm>
-            <a:off x="3204802" y="1297667"/>
-            <a:ext cx="45719" cy="360000"/>
-          </a:xfrm>
-          <a:prstGeom prst="rect">
-            <a:avLst/>
-          </a:prstGeom>
-        </p:spPr>
-        <p:style>
-          <a:lnRef idx="2">
-            <a:schemeClr val="accent1">
-              <a:shade val="50000"/>
-            </a:schemeClr>
-          </a:lnRef>
-          <a:fillRef idx="1">
-            <a:schemeClr val="accent1"/>
-          </a:fillRef>
-          <a:effectRef idx="0">
-            <a:schemeClr val="accent1"/>
-          </a:effectRef>
-          <a:fontRef idx="minor">
-            <a:schemeClr val="lt1"/>
-          </a:fontRef>
-        </p:style>
-        <p:txBody>
-          <a:bodyPr rtlCol="0" anchor="ctr"/>
-          <a:lstStyle/>
-          <a:p>
-            <a:pPr algn="ctr"/>
-            <a:endParaRPr lang="ko-KR" altLang="en-US"/>
-          </a:p>
-        </p:txBody>
-      </p:sp>
-      <p:sp>
-        <p:nvSpPr>
-          <p:cNvPr id="45" name="직사각형 44">
-            <a:extLst>
-              <a:ext uri="{FF2B5EF4-FFF2-40B4-BE49-F238E27FC236}">
-                <a16:creationId xmlns:a16="http://schemas.microsoft.com/office/drawing/2014/main" id="{32AB1BA8-A0F4-4BF9-94AA-E38F55146DA7}"/>
-              </a:ext>
-            </a:extLst>
-          </p:cNvPr>
-          <p:cNvSpPr/>
-          <p:nvPr/>
-        </p:nvSpPr>
-        <p:spPr>
-          <a:xfrm>
-            <a:off x="3904740" y="1252267"/>
-            <a:ext cx="45719" cy="360000"/>
-          </a:xfrm>
-          <a:prstGeom prst="rect">
-            <a:avLst/>
-          </a:prstGeom>
-        </p:spPr>
-        <p:style>
-          <a:lnRef idx="2">
-            <a:schemeClr val="accent1">
-              <a:shade val="50000"/>
-            </a:schemeClr>
-          </a:lnRef>
-          <a:fillRef idx="1">
-            <a:schemeClr val="accent1"/>
-          </a:fillRef>
-          <a:effectRef idx="0">
-            <a:schemeClr val="accent1"/>
-          </a:effectRef>
-          <a:fontRef idx="minor">
-            <a:schemeClr val="lt1"/>
-          </a:fontRef>
-        </p:style>
-        <p:txBody>
-          <a:bodyPr rtlCol="0" anchor="ctr"/>
-          <a:lstStyle/>
-          <a:p>
-            <a:pPr algn="ctr"/>
-            <a:endParaRPr lang="ko-KR" altLang="en-US"/>
-          </a:p>
-        </p:txBody>
-      </p:sp>
-      <p:sp>
-        <p:nvSpPr>
-          <p:cNvPr id="46" name="직사각형 45">
-            <a:extLst>
-              <a:ext uri="{FF2B5EF4-FFF2-40B4-BE49-F238E27FC236}">
-                <a16:creationId xmlns:a16="http://schemas.microsoft.com/office/drawing/2014/main" id="{9F6C9851-885C-4FA4-929B-ABC5C53802DE}"/>
-              </a:ext>
-            </a:extLst>
-          </p:cNvPr>
-          <p:cNvSpPr/>
-          <p:nvPr/>
-        </p:nvSpPr>
-        <p:spPr>
-          <a:xfrm>
-            <a:off x="1047523" y="1237193"/>
-            <a:ext cx="45719" cy="360000"/>
-          </a:xfrm>
-          <a:prstGeom prst="rect">
-            <a:avLst/>
-          </a:prstGeom>
-        </p:spPr>
-        <p:style>
-          <a:lnRef idx="2">
-            <a:schemeClr val="accent1">
-              <a:shade val="50000"/>
-            </a:schemeClr>
-          </a:lnRef>
-          <a:fillRef idx="1">
-            <a:schemeClr val="accent1"/>
-          </a:fillRef>
-          <a:effectRef idx="0">
-            <a:schemeClr val="accent1"/>
-          </a:effectRef>
-          <a:fontRef idx="minor">
-            <a:schemeClr val="lt1"/>
-          </a:fontRef>
-        </p:style>
-        <p:txBody>
-          <a:bodyPr rtlCol="0" anchor="ctr"/>
-          <a:lstStyle/>
-          <a:p>
-            <a:pPr algn="ctr"/>
-            <a:endParaRPr lang="ko-KR" altLang="en-US"/>
-          </a:p>
-        </p:txBody>
-      </p:sp>
-      <p:sp>
-        <p:nvSpPr>
-          <p:cNvPr id="2" name="TextBox 1">
-            <a:extLst>
-              <a:ext uri="{FF2B5EF4-FFF2-40B4-BE49-F238E27FC236}">
-                <a16:creationId xmlns:a16="http://schemas.microsoft.com/office/drawing/2014/main" id="{2B761342-8050-4C66-8238-8E69BEB423BF}"/>
-              </a:ext>
-            </a:extLst>
-          </p:cNvPr>
-          <p:cNvSpPr txBox="1"/>
-          <p:nvPr/>
-        </p:nvSpPr>
-        <p:spPr>
-          <a:xfrm>
-            <a:off x="336000" y="549000"/>
-            <a:ext cx="4320000" cy="369332"/>
-          </a:xfrm>
-          <a:prstGeom prst="rect">
-            <a:avLst/>
-          </a:prstGeom>
-          <a:noFill/>
-        </p:spPr>
-        <p:txBody>
-          <a:bodyPr wrap="square" rtlCol="0">
-            <a:spAutoFit/>
-          </a:bodyPr>
-          <a:lstStyle/>
-          <a:p>
-            <a:r>
-              <a:rPr lang="en-US" altLang="ko-KR" dirty="0"/>
-              <a:t>  -5   4   3  2   1   0   1   2   3   4   5 </a:t>
-            </a:r>
-            <a:endParaRPr lang="ko-KR" altLang="en-US" dirty="0"/>
-          </a:p>
-        </p:txBody>
-      </p:sp>
-      <p:sp>
-        <p:nvSpPr>
-          <p:cNvPr id="6" name="TextBox 5">
-            <a:extLst>
-              <a:ext uri="{FF2B5EF4-FFF2-40B4-BE49-F238E27FC236}">
-                <a16:creationId xmlns:a16="http://schemas.microsoft.com/office/drawing/2014/main" id="{D7618E02-B1C1-4103-AA8A-C5C0A9FB7854}"/>
-              </a:ext>
-            </a:extLst>
-          </p:cNvPr>
-          <p:cNvSpPr txBox="1"/>
-          <p:nvPr/>
-        </p:nvSpPr>
-        <p:spPr>
-          <a:xfrm>
-            <a:off x="155173" y="552565"/>
-            <a:ext cx="461665" cy="4274281"/>
-          </a:xfrm>
-          <a:prstGeom prst="rect">
-            <a:avLst/>
-          </a:prstGeom>
-          <a:noFill/>
-        </p:spPr>
-        <p:txBody>
-          <a:bodyPr vert="eaVert" wrap="square" rtlCol="0">
-            <a:spAutoFit/>
-          </a:bodyPr>
-          <a:lstStyle/>
-          <a:p>
-            <a:r>
-              <a:rPr lang="en-US" altLang="ko-KR" dirty="0"/>
-              <a:t>   -5  -4 -3 -2  -1   0   1   2   3  4   5</a:t>
-            </a:r>
-            <a:endParaRPr lang="ko-KR" altLang="en-US" dirty="0"/>
-          </a:p>
-        </p:txBody>
-      </p:sp>
-      <p:sp>
-        <p:nvSpPr>
-          <p:cNvPr id="47" name="직사각형 46">
-            <a:extLst>
-              <a:ext uri="{FF2B5EF4-FFF2-40B4-BE49-F238E27FC236}">
-                <a16:creationId xmlns:a16="http://schemas.microsoft.com/office/drawing/2014/main" id="{00209665-C3B4-42ED-B71D-7856E8E049AC}"/>
-              </a:ext>
-            </a:extLst>
-          </p:cNvPr>
-          <p:cNvSpPr/>
-          <p:nvPr/>
-        </p:nvSpPr>
-        <p:spPr>
-          <a:xfrm>
-            <a:off x="3204803" y="2713739"/>
-            <a:ext cx="154894" cy="139197"/>
-          </a:xfrm>
-          <a:prstGeom prst="rect">
-            <a:avLst/>
-          </a:prstGeom>
-          <a:solidFill>
-            <a:srgbClr val="FF0000"/>
-          </a:solidFill>
-        </p:spPr>
-        <p:style>
-          <a:lnRef idx="2">
-            <a:schemeClr val="accent1">
-              <a:shade val="50000"/>
-            </a:schemeClr>
-          </a:lnRef>
-          <a:fillRef idx="1">
-            <a:schemeClr val="accent1"/>
-          </a:fillRef>
-          <a:effectRef idx="0">
-            <a:schemeClr val="accent1"/>
-          </a:effectRef>
-          <a:fontRef idx="minor">
-            <a:schemeClr val="lt1"/>
-          </a:fontRef>
-        </p:style>
-        <p:txBody>
-          <a:bodyPr rtlCol="0" anchor="ctr"/>
-          <a:lstStyle/>
-          <a:p>
-            <a:pPr algn="ctr"/>
-            <a:endParaRPr lang="ko-KR" altLang="en-US"/>
-          </a:p>
-        </p:txBody>
-      </p:sp>
-      <p:sp>
-        <p:nvSpPr>
-          <p:cNvPr id="48" name="직사각형 47">
-            <a:extLst>
-              <a:ext uri="{FF2B5EF4-FFF2-40B4-BE49-F238E27FC236}">
-                <a16:creationId xmlns:a16="http://schemas.microsoft.com/office/drawing/2014/main" id="{589B0A2F-77DC-4031-90E5-0F9BBDB5A799}"/>
-              </a:ext>
-            </a:extLst>
-          </p:cNvPr>
-          <p:cNvSpPr/>
-          <p:nvPr/>
-        </p:nvSpPr>
-        <p:spPr>
-          <a:xfrm>
-            <a:off x="1629649" y="2713739"/>
-            <a:ext cx="154894" cy="139197"/>
-          </a:xfrm>
-          <a:prstGeom prst="rect">
-            <a:avLst/>
-          </a:prstGeom>
-          <a:solidFill>
-            <a:srgbClr val="FF0000"/>
-          </a:solidFill>
-        </p:spPr>
-        <p:style>
-          <a:lnRef idx="2">
-            <a:schemeClr val="accent1">
-              <a:shade val="50000"/>
-            </a:schemeClr>
-          </a:lnRef>
-          <a:fillRef idx="1">
-            <a:schemeClr val="accent1"/>
-          </a:fillRef>
-          <a:effectRef idx="0">
-            <a:schemeClr val="accent1"/>
-          </a:effectRef>
-          <a:fontRef idx="minor">
-            <a:schemeClr val="lt1"/>
-          </a:fontRef>
-        </p:style>
-        <p:txBody>
-          <a:bodyPr rtlCol="0" anchor="ctr"/>
-          <a:lstStyle/>
-          <a:p>
-            <a:pPr algn="ctr"/>
-            <a:endParaRPr lang="ko-KR" altLang="en-US"/>
-          </a:p>
-        </p:txBody>
-      </p:sp>
-      <p:sp>
-        <p:nvSpPr>
-          <p:cNvPr id="49" name="직사각형 48">
-            <a:extLst>
-              <a:ext uri="{FF2B5EF4-FFF2-40B4-BE49-F238E27FC236}">
-                <a16:creationId xmlns:a16="http://schemas.microsoft.com/office/drawing/2014/main" id="{A6EEDAB5-DC4E-4D34-9A19-A88ED9D4132E}"/>
-              </a:ext>
-            </a:extLst>
-          </p:cNvPr>
-          <p:cNvSpPr/>
-          <p:nvPr/>
-        </p:nvSpPr>
-        <p:spPr>
-          <a:xfrm>
-            <a:off x="1051032" y="3435669"/>
-            <a:ext cx="154894" cy="139197"/>
-          </a:xfrm>
-          <a:prstGeom prst="rect">
-            <a:avLst/>
-          </a:prstGeom>
-          <a:solidFill>
-            <a:srgbClr val="FF0000"/>
-          </a:solidFill>
-        </p:spPr>
-        <p:style>
-          <a:lnRef idx="2">
-            <a:schemeClr val="accent1">
-              <a:shade val="50000"/>
-            </a:schemeClr>
-          </a:lnRef>
-          <a:fillRef idx="1">
-            <a:schemeClr val="accent1"/>
-          </a:fillRef>
-          <a:effectRef idx="0">
-            <a:schemeClr val="accent1"/>
-          </a:effectRef>
-          <a:fontRef idx="minor">
-            <a:schemeClr val="lt1"/>
-          </a:fontRef>
-        </p:style>
-        <p:txBody>
-          <a:bodyPr rtlCol="0" anchor="ctr"/>
-          <a:lstStyle/>
-          <a:p>
-            <a:pPr algn="ctr"/>
-            <a:endParaRPr lang="ko-KR" altLang="en-US"/>
-          </a:p>
-        </p:txBody>
-      </p:sp>
-      <p:sp>
-        <p:nvSpPr>
-          <p:cNvPr id="50" name="직사각형 49">
-            <a:extLst>
-              <a:ext uri="{FF2B5EF4-FFF2-40B4-BE49-F238E27FC236}">
-                <a16:creationId xmlns:a16="http://schemas.microsoft.com/office/drawing/2014/main" id="{85255BB1-3E3F-4EA0-97C7-DDB15E1AC5C6}"/>
-              </a:ext>
-            </a:extLst>
-          </p:cNvPr>
-          <p:cNvSpPr/>
-          <p:nvPr/>
-        </p:nvSpPr>
-        <p:spPr>
-          <a:xfrm>
-            <a:off x="3769093" y="3438208"/>
-            <a:ext cx="154894" cy="139197"/>
-          </a:xfrm>
-          <a:prstGeom prst="rect">
-            <a:avLst/>
-          </a:prstGeom>
-          <a:solidFill>
-            <a:srgbClr val="FF0000"/>
-          </a:solidFill>
-        </p:spPr>
-        <p:style>
-          <a:lnRef idx="2">
-            <a:schemeClr val="accent1">
-              <a:shade val="50000"/>
-            </a:schemeClr>
-          </a:lnRef>
-          <a:fillRef idx="1">
-            <a:schemeClr val="accent1"/>
-          </a:fillRef>
-          <a:effectRef idx="0">
-            <a:schemeClr val="accent1"/>
-          </a:effectRef>
-          <a:fontRef idx="minor">
-            <a:schemeClr val="lt1"/>
-          </a:fontRef>
-        </p:style>
-        <p:txBody>
-          <a:bodyPr rtlCol="0" anchor="ctr"/>
-          <a:lstStyle/>
-          <a:p>
-            <a:pPr algn="ctr"/>
-            <a:endParaRPr lang="ko-KR" altLang="en-US"/>
-          </a:p>
-        </p:txBody>
-      </p:sp>
-      <p:sp>
-        <p:nvSpPr>
-          <p:cNvPr id="51" name="직사각형 50">
-            <a:extLst>
-              <a:ext uri="{FF2B5EF4-FFF2-40B4-BE49-F238E27FC236}">
-                <a16:creationId xmlns:a16="http://schemas.microsoft.com/office/drawing/2014/main" id="{D4E015A1-0350-4F13-9899-76C3391D2BDB}"/>
-              </a:ext>
-            </a:extLst>
-          </p:cNvPr>
-          <p:cNvSpPr/>
-          <p:nvPr/>
-        </p:nvSpPr>
-        <p:spPr>
-          <a:xfrm>
-            <a:off x="1793273" y="3783064"/>
-            <a:ext cx="154894" cy="139197"/>
-          </a:xfrm>
-          <a:prstGeom prst="rect">
-            <a:avLst/>
-          </a:prstGeom>
-          <a:solidFill>
-            <a:srgbClr val="FF0000"/>
-          </a:solidFill>
-        </p:spPr>
-        <p:style>
-          <a:lnRef idx="2">
-            <a:schemeClr val="accent1">
-              <a:shade val="50000"/>
-            </a:schemeClr>
-          </a:lnRef>
-          <a:fillRef idx="1">
-            <a:schemeClr val="accent1"/>
-          </a:fillRef>
-          <a:effectRef idx="0">
-            <a:schemeClr val="accent1"/>
-          </a:effectRef>
-          <a:fontRef idx="minor">
-            <a:schemeClr val="lt1"/>
-          </a:fontRef>
-        </p:style>
-        <p:txBody>
-          <a:bodyPr rtlCol="0" anchor="ctr"/>
-          <a:lstStyle/>
-          <a:p>
-            <a:pPr algn="ctr"/>
-            <a:endParaRPr lang="ko-KR" altLang="en-US"/>
-          </a:p>
-        </p:txBody>
-      </p:sp>
-      <p:sp>
-        <p:nvSpPr>
-          <p:cNvPr id="52" name="직사각형 51">
-            <a:extLst>
-              <a:ext uri="{FF2B5EF4-FFF2-40B4-BE49-F238E27FC236}">
-                <a16:creationId xmlns:a16="http://schemas.microsoft.com/office/drawing/2014/main" id="{47648242-9536-42F5-8A86-81A2E277E58E}"/>
-              </a:ext>
-            </a:extLst>
-          </p:cNvPr>
-          <p:cNvSpPr/>
-          <p:nvPr/>
-        </p:nvSpPr>
-        <p:spPr>
-          <a:xfrm>
-            <a:off x="3089926" y="3769375"/>
-            <a:ext cx="154894" cy="139197"/>
-          </a:xfrm>
-          <a:prstGeom prst="rect">
-            <a:avLst/>
-          </a:prstGeom>
-          <a:solidFill>
-            <a:srgbClr val="FF0000"/>
-          </a:solidFill>
-        </p:spPr>
-        <p:style>
-          <a:lnRef idx="2">
-            <a:schemeClr val="accent1">
-              <a:shade val="50000"/>
-            </a:schemeClr>
-          </a:lnRef>
-          <a:fillRef idx="1">
-            <a:schemeClr val="accent1"/>
-          </a:fillRef>
-          <a:effectRef idx="0">
-            <a:schemeClr val="accent1"/>
-          </a:effectRef>
-          <a:fontRef idx="minor">
-            <a:schemeClr val="lt1"/>
-          </a:fontRef>
-        </p:style>
-        <p:txBody>
-          <a:bodyPr rtlCol="0" anchor="ctr"/>
-          <a:lstStyle/>
-          <a:p>
-            <a:pPr algn="ctr"/>
-            <a:endParaRPr lang="ko-KR" altLang="en-US"/>
-          </a:p>
-        </p:txBody>
-      </p:sp>
-      <p:sp>
-        <p:nvSpPr>
-          <p:cNvPr id="53" name="직사각형 52">
-            <a:extLst>
-              <a:ext uri="{FF2B5EF4-FFF2-40B4-BE49-F238E27FC236}">
-                <a16:creationId xmlns:a16="http://schemas.microsoft.com/office/drawing/2014/main" id="{EC1ABDE6-BD5F-4607-99EC-48DDC03352D0}"/>
-              </a:ext>
-            </a:extLst>
-          </p:cNvPr>
-          <p:cNvSpPr/>
-          <p:nvPr/>
-        </p:nvSpPr>
-        <p:spPr>
-          <a:xfrm>
-            <a:off x="3216648" y="924866"/>
-            <a:ext cx="154894" cy="139197"/>
-          </a:xfrm>
-          <a:prstGeom prst="rect">
-            <a:avLst/>
-          </a:prstGeom>
-          <a:solidFill>
-            <a:srgbClr val="FF0000"/>
-          </a:solidFill>
-        </p:spPr>
-        <p:style>
-          <a:lnRef idx="2">
-            <a:schemeClr val="accent1">
-              <a:shade val="50000"/>
-            </a:schemeClr>
-          </a:lnRef>
-          <a:fillRef idx="1">
-            <a:schemeClr val="accent1"/>
-          </a:fillRef>
-          <a:effectRef idx="0">
-            <a:schemeClr val="accent1"/>
-          </a:effectRef>
-          <a:fontRef idx="minor">
-            <a:schemeClr val="lt1"/>
-          </a:fontRef>
-        </p:style>
-        <p:txBody>
-          <a:bodyPr rtlCol="0" anchor="ctr"/>
-          <a:lstStyle/>
-          <a:p>
-            <a:pPr algn="ctr"/>
-            <a:endParaRPr lang="ko-KR" altLang="en-US"/>
-          </a:p>
-        </p:txBody>
-      </p:sp>
-      <p:sp>
-        <p:nvSpPr>
-          <p:cNvPr id="54" name="직사각형 53">
-            <a:extLst>
-              <a:ext uri="{FF2B5EF4-FFF2-40B4-BE49-F238E27FC236}">
-                <a16:creationId xmlns:a16="http://schemas.microsoft.com/office/drawing/2014/main" id="{86FD3CA8-45A0-405B-95AE-082C980E16F4}"/>
-              </a:ext>
-            </a:extLst>
-          </p:cNvPr>
-          <p:cNvSpPr/>
-          <p:nvPr/>
-        </p:nvSpPr>
-        <p:spPr>
-          <a:xfrm>
-            <a:off x="1608900" y="918332"/>
-            <a:ext cx="154894" cy="139197"/>
-          </a:xfrm>
-          <a:prstGeom prst="rect">
-            <a:avLst/>
-          </a:prstGeom>
-          <a:solidFill>
-            <a:srgbClr val="FF0000"/>
-          </a:solidFill>
-        </p:spPr>
-        <p:style>
-          <a:lnRef idx="2">
-            <a:schemeClr val="accent1">
-              <a:shade val="50000"/>
-            </a:schemeClr>
-          </a:lnRef>
-          <a:fillRef idx="1">
-            <a:schemeClr val="accent1"/>
-          </a:fillRef>
-          <a:effectRef idx="0">
-            <a:schemeClr val="accent1"/>
-          </a:effectRef>
-          <a:fontRef idx="minor">
-            <a:schemeClr val="lt1"/>
-          </a:fontRef>
-        </p:style>
-        <p:txBody>
-          <a:bodyPr rtlCol="0" anchor="ctr"/>
-          <a:lstStyle/>
-          <a:p>
-            <a:pPr algn="ctr"/>
-            <a:endParaRPr lang="ko-KR" altLang="en-US"/>
-          </a:p>
-        </p:txBody>
-      </p:sp>
-      <p:sp>
-        <p:nvSpPr>
-          <p:cNvPr id="55" name="직사각형 54">
-            <a:extLst>
-              <a:ext uri="{FF2B5EF4-FFF2-40B4-BE49-F238E27FC236}">
-                <a16:creationId xmlns:a16="http://schemas.microsoft.com/office/drawing/2014/main" id="{AE06F886-C984-4AD8-833B-1F706D6DBBC8}"/>
-              </a:ext>
-            </a:extLst>
-          </p:cNvPr>
-          <p:cNvSpPr/>
-          <p:nvPr/>
-        </p:nvSpPr>
-        <p:spPr>
-          <a:xfrm>
-            <a:off x="2502765" y="1271998"/>
-            <a:ext cx="154894" cy="139197"/>
-          </a:xfrm>
-          <a:prstGeom prst="rect">
-            <a:avLst/>
-          </a:prstGeom>
-          <a:solidFill>
-            <a:srgbClr val="FF0000"/>
-          </a:solidFill>
-        </p:spPr>
-        <p:style>
-          <a:lnRef idx="2">
-            <a:schemeClr val="accent1">
-              <a:shade val="50000"/>
-            </a:schemeClr>
-          </a:lnRef>
-          <a:fillRef idx="1">
-            <a:schemeClr val="accent1"/>
-          </a:fillRef>
-          <a:effectRef idx="0">
-            <a:schemeClr val="accent1"/>
-          </a:effectRef>
-          <a:fontRef idx="minor">
-            <a:schemeClr val="lt1"/>
-          </a:fontRef>
-        </p:style>
-        <p:txBody>
-          <a:bodyPr rtlCol="0" anchor="ctr"/>
-          <a:lstStyle/>
-          <a:p>
-            <a:pPr algn="ctr"/>
-            <a:endParaRPr lang="ko-KR" altLang="en-US"/>
-          </a:p>
-        </p:txBody>
-      </p:sp>
-    </p:spTree>
-    <p:extLst>
-      <p:ext uri="{BB962C8B-B14F-4D97-AF65-F5344CB8AC3E}">
-        <p14:creationId xmlns:p14="http://schemas.microsoft.com/office/powerpoint/2010/main" val="4200191877"/>
-      </p:ext>
-    </p:extLst>
-  </p:cSld>
-  <p:clrMapOvr>
-    <a:masterClrMapping/>
-  </p:clrMapOvr>
-</p:sld>
-</file>
-
-<file path=ppt/slides/slide4.xml><?xml version="1.0" encoding="utf-8"?>
-<p:sld xmlns:a="http://schemas.openxmlformats.org/drawingml/2006/main" xmlns:r="http://schemas.openxmlformats.org/officeDocument/2006/relationships" xmlns:p="http://schemas.openxmlformats.org/presentationml/2006/main">
-  <p:cSld>
-    <p:spTree>
-      <p:nvGrpSpPr>
-        <p:cNvPr id="1" name=""/>
-        <p:cNvGrpSpPr/>
-        <p:nvPr/>
-      </p:nvGrpSpPr>
-      <p:grpSpPr>
-        <a:xfrm>
-          <a:off x="0" y="0"/>
-          <a:ext cx="0" cy="0"/>
-          <a:chOff x="0" y="0"/>
-          <a:chExt cx="0" cy="0"/>
-        </a:xfrm>
-      </p:grpSpPr>
       <p:pic>
         <p:nvPicPr>
           <p:cNvPr id="2" name="그림 1">

</xml_diff>

<commit_message>
Revert "Revert "Merge branch 'HSJ'""
This reverts commit d3f3c9353c8f649d1806104b586b2a6e4fff0f4c.
</commit_message>
<xml_diff>
--- a/CG_Final_Project/파이널 프로젝트 .pptx
+++ b/CG_Final_Project/파이널 프로젝트 .pptx
@@ -7,7 +7,8 @@
   <p:sldIdLst>
     <p:sldId id="256" r:id="rId2"/>
     <p:sldId id="257" r:id="rId3"/>
-    <p:sldId id="258" r:id="rId4"/>
+    <p:sldId id="259" r:id="rId4"/>
+    <p:sldId id="258" r:id="rId5"/>
   </p:sldIdLst>
   <p:sldSz cx="12192000" cy="6858000"/>
   <p:notesSz cx="6858000" cy="9144000"/>
@@ -5309,6 +5310,2337 @@
           <a:chExt cx="0" cy="0"/>
         </a:xfrm>
       </p:grpSpPr>
+      <p:sp>
+        <p:nvSpPr>
+          <p:cNvPr id="4" name="직사각형 3">
+            <a:extLst>
+              <a:ext uri="{FF2B5EF4-FFF2-40B4-BE49-F238E27FC236}">
+                <a16:creationId xmlns:a16="http://schemas.microsoft.com/office/drawing/2014/main" id="{8EEC2752-2F31-4F33-AFB2-F3E9FF22CAE5}"/>
+              </a:ext>
+            </a:extLst>
+          </p:cNvPr>
+          <p:cNvSpPr>
+            <a:spLocks/>
+          </p:cNvSpPr>
+          <p:nvPr/>
+        </p:nvSpPr>
+        <p:spPr>
+          <a:xfrm>
+            <a:off x="696000" y="909000"/>
+            <a:ext cx="3600000" cy="3600000"/>
+          </a:xfrm>
+          <a:prstGeom prst="rect">
+            <a:avLst/>
+          </a:prstGeom>
+          <a:noFill/>
+          <a:ln w="25400"/>
+        </p:spPr>
+        <p:style>
+          <a:lnRef idx="2">
+            <a:schemeClr val="accent1">
+              <a:shade val="50000"/>
+            </a:schemeClr>
+          </a:lnRef>
+          <a:fillRef idx="1">
+            <a:schemeClr val="accent1"/>
+          </a:fillRef>
+          <a:effectRef idx="0">
+            <a:schemeClr val="accent1"/>
+          </a:effectRef>
+          <a:fontRef idx="minor">
+            <a:schemeClr val="lt1"/>
+          </a:fontRef>
+        </p:style>
+        <p:txBody>
+          <a:bodyPr rtlCol="0" anchor="ctr"/>
+          <a:lstStyle/>
+          <a:p>
+            <a:pPr algn="ctr"/>
+            <a:endParaRPr lang="ko-KR" altLang="en-US"/>
+          </a:p>
+        </p:txBody>
+      </p:sp>
+      <p:sp>
+        <p:nvSpPr>
+          <p:cNvPr id="5" name="직사각형 4">
+            <a:extLst>
+              <a:ext uri="{FF2B5EF4-FFF2-40B4-BE49-F238E27FC236}">
+                <a16:creationId xmlns:a16="http://schemas.microsoft.com/office/drawing/2014/main" id="{24CB5D56-4BAB-4D5E-B773-D0852F5213E9}"/>
+              </a:ext>
+            </a:extLst>
+          </p:cNvPr>
+          <p:cNvSpPr/>
+          <p:nvPr/>
+        </p:nvSpPr>
+        <p:spPr>
+          <a:xfrm>
+            <a:off x="1056000" y="4149000"/>
+            <a:ext cx="765719" cy="45719"/>
+          </a:xfrm>
+          <a:prstGeom prst="rect">
+            <a:avLst/>
+          </a:prstGeom>
+        </p:spPr>
+        <p:style>
+          <a:lnRef idx="2">
+            <a:schemeClr val="accent1">
+              <a:shade val="50000"/>
+            </a:schemeClr>
+          </a:lnRef>
+          <a:fillRef idx="1">
+            <a:schemeClr val="accent1"/>
+          </a:fillRef>
+          <a:effectRef idx="0">
+            <a:schemeClr val="accent1"/>
+          </a:effectRef>
+          <a:fontRef idx="minor">
+            <a:schemeClr val="lt1"/>
+          </a:fontRef>
+        </p:style>
+        <p:txBody>
+          <a:bodyPr rtlCol="0" anchor="ctr"/>
+          <a:lstStyle/>
+          <a:p>
+            <a:pPr algn="ctr"/>
+            <a:endParaRPr lang="ko-KR" altLang="en-US"/>
+          </a:p>
+        </p:txBody>
+      </p:sp>
+      <p:pic>
+        <p:nvPicPr>
+          <p:cNvPr id="7" name="그림 6">
+            <a:extLst>
+              <a:ext uri="{FF2B5EF4-FFF2-40B4-BE49-F238E27FC236}">
+                <a16:creationId xmlns:a16="http://schemas.microsoft.com/office/drawing/2014/main" id="{4354C7D0-7EB5-4AEB-A11E-B6B49805739F}"/>
+              </a:ext>
+            </a:extLst>
+          </p:cNvPr>
+          <p:cNvPicPr>
+            <a:picLocks noChangeAspect="1"/>
+          </p:cNvPicPr>
+          <p:nvPr/>
+        </p:nvPicPr>
+        <p:blipFill>
+          <a:blip r:embed="rId2"/>
+          <a:stretch>
+            <a:fillRect/>
+          </a:stretch>
+        </p:blipFill>
+        <p:spPr>
+          <a:xfrm>
+            <a:off x="5016000" y="549000"/>
+            <a:ext cx="4248150" cy="4676775"/>
+          </a:xfrm>
+          <a:prstGeom prst="rect">
+            <a:avLst/>
+          </a:prstGeom>
+        </p:spPr>
+      </p:pic>
+      <p:sp>
+        <p:nvSpPr>
+          <p:cNvPr id="8" name="직사각형 7">
+            <a:extLst>
+              <a:ext uri="{FF2B5EF4-FFF2-40B4-BE49-F238E27FC236}">
+                <a16:creationId xmlns:a16="http://schemas.microsoft.com/office/drawing/2014/main" id="{CE1C4586-7253-4887-A2E9-8B106614C80A}"/>
+              </a:ext>
+            </a:extLst>
+          </p:cNvPr>
+          <p:cNvSpPr/>
+          <p:nvPr/>
+        </p:nvSpPr>
+        <p:spPr>
+          <a:xfrm>
+            <a:off x="1416539" y="3789000"/>
+            <a:ext cx="45719" cy="360000"/>
+          </a:xfrm>
+          <a:prstGeom prst="rect">
+            <a:avLst/>
+          </a:prstGeom>
+        </p:spPr>
+        <p:style>
+          <a:lnRef idx="2">
+            <a:schemeClr val="accent1">
+              <a:shade val="50000"/>
+            </a:schemeClr>
+          </a:lnRef>
+          <a:fillRef idx="1">
+            <a:schemeClr val="accent1"/>
+          </a:fillRef>
+          <a:effectRef idx="0">
+            <a:schemeClr val="accent1"/>
+          </a:effectRef>
+          <a:fontRef idx="minor">
+            <a:schemeClr val="lt1"/>
+          </a:fontRef>
+        </p:style>
+        <p:txBody>
+          <a:bodyPr rtlCol="0" anchor="ctr"/>
+          <a:lstStyle/>
+          <a:p>
+            <a:pPr algn="ctr"/>
+            <a:endParaRPr lang="ko-KR" altLang="en-US"/>
+          </a:p>
+        </p:txBody>
+      </p:sp>
+      <p:sp>
+        <p:nvSpPr>
+          <p:cNvPr id="9" name="직사각형 8">
+            <a:extLst>
+              <a:ext uri="{FF2B5EF4-FFF2-40B4-BE49-F238E27FC236}">
+                <a16:creationId xmlns:a16="http://schemas.microsoft.com/office/drawing/2014/main" id="{002A2B31-3A69-4F33-8AFF-3102841393EC}"/>
+              </a:ext>
+            </a:extLst>
+          </p:cNvPr>
+          <p:cNvSpPr/>
+          <p:nvPr/>
+        </p:nvSpPr>
+        <p:spPr>
+          <a:xfrm>
+            <a:off x="2136000" y="3789000"/>
+            <a:ext cx="720000" cy="45719"/>
+          </a:xfrm>
+          <a:prstGeom prst="rect">
+            <a:avLst/>
+          </a:prstGeom>
+        </p:spPr>
+        <p:style>
+          <a:lnRef idx="2">
+            <a:schemeClr val="accent1">
+              <a:shade val="50000"/>
+            </a:schemeClr>
+          </a:lnRef>
+          <a:fillRef idx="1">
+            <a:schemeClr val="accent1"/>
+          </a:fillRef>
+          <a:effectRef idx="0">
+            <a:schemeClr val="accent1"/>
+          </a:effectRef>
+          <a:fontRef idx="minor">
+            <a:schemeClr val="lt1"/>
+          </a:fontRef>
+        </p:style>
+        <p:txBody>
+          <a:bodyPr rtlCol="0" anchor="ctr"/>
+          <a:lstStyle/>
+          <a:p>
+            <a:pPr algn="ctr"/>
+            <a:endParaRPr lang="ko-KR" altLang="en-US"/>
+          </a:p>
+        </p:txBody>
+      </p:sp>
+      <p:sp>
+        <p:nvSpPr>
+          <p:cNvPr id="10" name="직사각형 9">
+            <a:extLst>
+              <a:ext uri="{FF2B5EF4-FFF2-40B4-BE49-F238E27FC236}">
+                <a16:creationId xmlns:a16="http://schemas.microsoft.com/office/drawing/2014/main" id="{CE337292-7681-4C93-803A-6067A07C710F}"/>
+              </a:ext>
+            </a:extLst>
+          </p:cNvPr>
+          <p:cNvSpPr/>
+          <p:nvPr/>
+        </p:nvSpPr>
+        <p:spPr>
+          <a:xfrm>
+            <a:off x="2483942" y="3789000"/>
+            <a:ext cx="45719" cy="405719"/>
+          </a:xfrm>
+          <a:prstGeom prst="rect">
+            <a:avLst/>
+          </a:prstGeom>
+        </p:spPr>
+        <p:style>
+          <a:lnRef idx="2">
+            <a:schemeClr val="accent1">
+              <a:shade val="50000"/>
+            </a:schemeClr>
+          </a:lnRef>
+          <a:fillRef idx="1">
+            <a:schemeClr val="accent1"/>
+          </a:fillRef>
+          <a:effectRef idx="0">
+            <a:schemeClr val="accent1"/>
+          </a:effectRef>
+          <a:fontRef idx="minor">
+            <a:schemeClr val="lt1"/>
+          </a:fontRef>
+        </p:style>
+        <p:txBody>
+          <a:bodyPr rtlCol="0" anchor="ctr"/>
+          <a:lstStyle/>
+          <a:p>
+            <a:pPr algn="ctr"/>
+            <a:endParaRPr lang="ko-KR" altLang="en-US"/>
+          </a:p>
+        </p:txBody>
+      </p:sp>
+      <p:sp>
+        <p:nvSpPr>
+          <p:cNvPr id="11" name="직사각형 10">
+            <a:extLst>
+              <a:ext uri="{FF2B5EF4-FFF2-40B4-BE49-F238E27FC236}">
+                <a16:creationId xmlns:a16="http://schemas.microsoft.com/office/drawing/2014/main" id="{527F600F-A9B9-4CD0-9FC4-AC3D2F3D72E7}"/>
+              </a:ext>
+            </a:extLst>
+          </p:cNvPr>
+          <p:cNvSpPr/>
+          <p:nvPr/>
+        </p:nvSpPr>
+        <p:spPr>
+          <a:xfrm>
+            <a:off x="3216000" y="4126140"/>
+            <a:ext cx="720000" cy="45719"/>
+          </a:xfrm>
+          <a:prstGeom prst="rect">
+            <a:avLst/>
+          </a:prstGeom>
+        </p:spPr>
+        <p:style>
+          <a:lnRef idx="2">
+            <a:schemeClr val="accent1">
+              <a:shade val="50000"/>
+            </a:schemeClr>
+          </a:lnRef>
+          <a:fillRef idx="1">
+            <a:schemeClr val="accent1"/>
+          </a:fillRef>
+          <a:effectRef idx="0">
+            <a:schemeClr val="accent1"/>
+          </a:effectRef>
+          <a:fontRef idx="minor">
+            <a:schemeClr val="lt1"/>
+          </a:fontRef>
+        </p:style>
+        <p:txBody>
+          <a:bodyPr rtlCol="0" anchor="ctr"/>
+          <a:lstStyle/>
+          <a:p>
+            <a:pPr algn="ctr"/>
+            <a:endParaRPr lang="ko-KR" altLang="en-US"/>
+          </a:p>
+        </p:txBody>
+      </p:sp>
+      <p:sp>
+        <p:nvSpPr>
+          <p:cNvPr id="12" name="직사각형 11">
+            <a:extLst>
+              <a:ext uri="{FF2B5EF4-FFF2-40B4-BE49-F238E27FC236}">
+                <a16:creationId xmlns:a16="http://schemas.microsoft.com/office/drawing/2014/main" id="{E8B8DEC1-E579-4857-8F15-1D73AED4E892}"/>
+              </a:ext>
+            </a:extLst>
+          </p:cNvPr>
+          <p:cNvSpPr/>
+          <p:nvPr/>
+        </p:nvSpPr>
+        <p:spPr>
+          <a:xfrm>
+            <a:off x="3597064" y="3766140"/>
+            <a:ext cx="45719" cy="382860"/>
+          </a:xfrm>
+          <a:prstGeom prst="rect">
+            <a:avLst/>
+          </a:prstGeom>
+        </p:spPr>
+        <p:style>
+          <a:lnRef idx="2">
+            <a:schemeClr val="accent1">
+              <a:shade val="50000"/>
+            </a:schemeClr>
+          </a:lnRef>
+          <a:fillRef idx="1">
+            <a:schemeClr val="accent1"/>
+          </a:fillRef>
+          <a:effectRef idx="0">
+            <a:schemeClr val="accent1"/>
+          </a:effectRef>
+          <a:fontRef idx="minor">
+            <a:schemeClr val="lt1"/>
+          </a:fontRef>
+        </p:style>
+        <p:txBody>
+          <a:bodyPr rtlCol="0" anchor="ctr"/>
+          <a:lstStyle/>
+          <a:p>
+            <a:pPr algn="ctr"/>
+            <a:endParaRPr lang="ko-KR" altLang="en-US"/>
+          </a:p>
+        </p:txBody>
+      </p:sp>
+      <p:sp>
+        <p:nvSpPr>
+          <p:cNvPr id="13" name="직사각형 12">
+            <a:extLst>
+              <a:ext uri="{FF2B5EF4-FFF2-40B4-BE49-F238E27FC236}">
+                <a16:creationId xmlns:a16="http://schemas.microsoft.com/office/drawing/2014/main" id="{E379CD3F-0F27-4FFE-9754-56C04192601B}"/>
+              </a:ext>
+            </a:extLst>
+          </p:cNvPr>
+          <p:cNvSpPr/>
+          <p:nvPr/>
+        </p:nvSpPr>
+        <p:spPr>
+          <a:xfrm>
+            <a:off x="3936000" y="3789000"/>
+            <a:ext cx="360000" cy="45719"/>
+          </a:xfrm>
+          <a:prstGeom prst="rect">
+            <a:avLst/>
+          </a:prstGeom>
+        </p:spPr>
+        <p:style>
+          <a:lnRef idx="2">
+            <a:schemeClr val="accent1">
+              <a:shade val="50000"/>
+            </a:schemeClr>
+          </a:lnRef>
+          <a:fillRef idx="1">
+            <a:schemeClr val="accent1"/>
+          </a:fillRef>
+          <a:effectRef idx="0">
+            <a:schemeClr val="accent1"/>
+          </a:effectRef>
+          <a:fontRef idx="minor">
+            <a:schemeClr val="lt1"/>
+          </a:fontRef>
+        </p:style>
+        <p:txBody>
+          <a:bodyPr rtlCol="0" anchor="ctr"/>
+          <a:lstStyle/>
+          <a:p>
+            <a:pPr algn="ctr"/>
+            <a:endParaRPr lang="ko-KR" altLang="en-US"/>
+          </a:p>
+        </p:txBody>
+      </p:sp>
+      <p:sp>
+        <p:nvSpPr>
+          <p:cNvPr id="14" name="직사각형 13">
+            <a:extLst>
+              <a:ext uri="{FF2B5EF4-FFF2-40B4-BE49-F238E27FC236}">
+                <a16:creationId xmlns:a16="http://schemas.microsoft.com/office/drawing/2014/main" id="{08917590-0B1F-42DA-AD7A-29D741D49311}"/>
+              </a:ext>
+            </a:extLst>
+          </p:cNvPr>
+          <p:cNvSpPr/>
+          <p:nvPr/>
+        </p:nvSpPr>
+        <p:spPr>
+          <a:xfrm>
+            <a:off x="691676" y="3789000"/>
+            <a:ext cx="360000" cy="45719"/>
+          </a:xfrm>
+          <a:prstGeom prst="rect">
+            <a:avLst/>
+          </a:prstGeom>
+        </p:spPr>
+        <p:style>
+          <a:lnRef idx="2">
+            <a:schemeClr val="accent1">
+              <a:shade val="50000"/>
+            </a:schemeClr>
+          </a:lnRef>
+          <a:fillRef idx="1">
+            <a:schemeClr val="accent1"/>
+          </a:fillRef>
+          <a:effectRef idx="0">
+            <a:schemeClr val="accent1"/>
+          </a:effectRef>
+          <a:fontRef idx="minor">
+            <a:schemeClr val="lt1"/>
+          </a:fontRef>
+        </p:style>
+        <p:txBody>
+          <a:bodyPr rtlCol="0" anchor="ctr"/>
+          <a:lstStyle/>
+          <a:p>
+            <a:pPr algn="ctr"/>
+            <a:endParaRPr lang="ko-KR" altLang="en-US"/>
+          </a:p>
+        </p:txBody>
+      </p:sp>
+      <p:sp>
+        <p:nvSpPr>
+          <p:cNvPr id="15" name="직사각형 14">
+            <a:extLst>
+              <a:ext uri="{FF2B5EF4-FFF2-40B4-BE49-F238E27FC236}">
+                <a16:creationId xmlns:a16="http://schemas.microsoft.com/office/drawing/2014/main" id="{B2053C42-B92F-419F-9610-0C153612800A}"/>
+              </a:ext>
+            </a:extLst>
+          </p:cNvPr>
+          <p:cNvSpPr/>
+          <p:nvPr/>
+        </p:nvSpPr>
+        <p:spPr>
+          <a:xfrm>
+            <a:off x="1018285" y="3069000"/>
+            <a:ext cx="443973" cy="45719"/>
+          </a:xfrm>
+          <a:prstGeom prst="rect">
+            <a:avLst/>
+          </a:prstGeom>
+        </p:spPr>
+        <p:style>
+          <a:lnRef idx="2">
+            <a:schemeClr val="accent1">
+              <a:shade val="50000"/>
+            </a:schemeClr>
+          </a:lnRef>
+          <a:fillRef idx="1">
+            <a:schemeClr val="accent1"/>
+          </a:fillRef>
+          <a:effectRef idx="0">
+            <a:schemeClr val="accent1"/>
+          </a:effectRef>
+          <a:fontRef idx="minor">
+            <a:schemeClr val="lt1"/>
+          </a:fontRef>
+        </p:style>
+        <p:txBody>
+          <a:bodyPr rtlCol="0" anchor="ctr"/>
+          <a:lstStyle/>
+          <a:p>
+            <a:pPr algn="ctr"/>
+            <a:endParaRPr lang="ko-KR" altLang="en-US"/>
+          </a:p>
+        </p:txBody>
+      </p:sp>
+      <p:sp>
+        <p:nvSpPr>
+          <p:cNvPr id="16" name="직사각형 15">
+            <a:extLst>
+              <a:ext uri="{FF2B5EF4-FFF2-40B4-BE49-F238E27FC236}">
+                <a16:creationId xmlns:a16="http://schemas.microsoft.com/office/drawing/2014/main" id="{841D7576-D55A-4265-AB50-41D3CE586F9F}"/>
+              </a:ext>
+            </a:extLst>
+          </p:cNvPr>
+          <p:cNvSpPr/>
+          <p:nvPr/>
+        </p:nvSpPr>
+        <p:spPr>
+          <a:xfrm>
+            <a:off x="1378285" y="3114719"/>
+            <a:ext cx="83973" cy="360000"/>
+          </a:xfrm>
+          <a:prstGeom prst="rect">
+            <a:avLst/>
+          </a:prstGeom>
+        </p:spPr>
+        <p:style>
+          <a:lnRef idx="2">
+            <a:schemeClr val="accent1">
+              <a:shade val="50000"/>
+            </a:schemeClr>
+          </a:lnRef>
+          <a:fillRef idx="1">
+            <a:schemeClr val="accent1"/>
+          </a:fillRef>
+          <a:effectRef idx="0">
+            <a:schemeClr val="accent1"/>
+          </a:effectRef>
+          <a:fontRef idx="minor">
+            <a:schemeClr val="lt1"/>
+          </a:fontRef>
+        </p:style>
+        <p:txBody>
+          <a:bodyPr rtlCol="0" anchor="ctr"/>
+          <a:lstStyle/>
+          <a:p>
+            <a:pPr algn="ctr"/>
+            <a:endParaRPr lang="ko-KR" altLang="en-US"/>
+          </a:p>
+        </p:txBody>
+      </p:sp>
+      <p:sp>
+        <p:nvSpPr>
+          <p:cNvPr id="17" name="직사각형 16">
+            <a:extLst>
+              <a:ext uri="{FF2B5EF4-FFF2-40B4-BE49-F238E27FC236}">
+                <a16:creationId xmlns:a16="http://schemas.microsoft.com/office/drawing/2014/main" id="{D00593C7-1C6E-45C8-8AA4-4673B44FD233}"/>
+              </a:ext>
+            </a:extLst>
+          </p:cNvPr>
+          <p:cNvSpPr/>
+          <p:nvPr/>
+        </p:nvSpPr>
+        <p:spPr>
+          <a:xfrm>
+            <a:off x="3506486" y="3046140"/>
+            <a:ext cx="443973" cy="45719"/>
+          </a:xfrm>
+          <a:prstGeom prst="rect">
+            <a:avLst/>
+          </a:prstGeom>
+        </p:spPr>
+        <p:style>
+          <a:lnRef idx="2">
+            <a:schemeClr val="accent1">
+              <a:shade val="50000"/>
+            </a:schemeClr>
+          </a:lnRef>
+          <a:fillRef idx="1">
+            <a:schemeClr val="accent1"/>
+          </a:fillRef>
+          <a:effectRef idx="0">
+            <a:schemeClr val="accent1"/>
+          </a:effectRef>
+          <a:fontRef idx="minor">
+            <a:schemeClr val="lt1"/>
+          </a:fontRef>
+        </p:style>
+        <p:txBody>
+          <a:bodyPr rtlCol="0" anchor="ctr"/>
+          <a:lstStyle/>
+          <a:p>
+            <a:pPr algn="ctr"/>
+            <a:endParaRPr lang="ko-KR" altLang="en-US"/>
+          </a:p>
+        </p:txBody>
+      </p:sp>
+      <p:sp>
+        <p:nvSpPr>
+          <p:cNvPr id="18" name="직사각형 17">
+            <a:extLst>
+              <a:ext uri="{FF2B5EF4-FFF2-40B4-BE49-F238E27FC236}">
+                <a16:creationId xmlns:a16="http://schemas.microsoft.com/office/drawing/2014/main" id="{D8BEA381-3C17-496A-8332-2CC72F362A2D}"/>
+              </a:ext>
+            </a:extLst>
+          </p:cNvPr>
+          <p:cNvSpPr/>
+          <p:nvPr/>
+        </p:nvSpPr>
+        <p:spPr>
+          <a:xfrm>
+            <a:off x="3525806" y="3107100"/>
+            <a:ext cx="45719" cy="360000"/>
+          </a:xfrm>
+          <a:prstGeom prst="rect">
+            <a:avLst/>
+          </a:prstGeom>
+        </p:spPr>
+        <p:style>
+          <a:lnRef idx="2">
+            <a:schemeClr val="accent1">
+              <a:shade val="50000"/>
+            </a:schemeClr>
+          </a:lnRef>
+          <a:fillRef idx="1">
+            <a:schemeClr val="accent1"/>
+          </a:fillRef>
+          <a:effectRef idx="0">
+            <a:schemeClr val="accent1"/>
+          </a:effectRef>
+          <a:fontRef idx="minor">
+            <a:schemeClr val="lt1"/>
+          </a:fontRef>
+        </p:style>
+        <p:txBody>
+          <a:bodyPr rtlCol="0" anchor="ctr"/>
+          <a:lstStyle/>
+          <a:p>
+            <a:pPr algn="ctr"/>
+            <a:endParaRPr lang="ko-KR" altLang="en-US"/>
+          </a:p>
+        </p:txBody>
+      </p:sp>
+      <p:sp>
+        <p:nvSpPr>
+          <p:cNvPr id="19" name="직사각형 18">
+            <a:extLst>
+              <a:ext uri="{FF2B5EF4-FFF2-40B4-BE49-F238E27FC236}">
+                <a16:creationId xmlns:a16="http://schemas.microsoft.com/office/drawing/2014/main" id="{09F00E1D-8C9A-448D-97A6-8550660064FC}"/>
+              </a:ext>
+            </a:extLst>
+          </p:cNvPr>
+          <p:cNvSpPr/>
+          <p:nvPr/>
+        </p:nvSpPr>
+        <p:spPr>
+          <a:xfrm>
+            <a:off x="2800847" y="3355865"/>
+            <a:ext cx="443973" cy="45719"/>
+          </a:xfrm>
+          <a:prstGeom prst="rect">
+            <a:avLst/>
+          </a:prstGeom>
+        </p:spPr>
+        <p:style>
+          <a:lnRef idx="2">
+            <a:schemeClr val="accent1">
+              <a:shade val="50000"/>
+            </a:schemeClr>
+          </a:lnRef>
+          <a:fillRef idx="1">
+            <a:schemeClr val="accent1"/>
+          </a:fillRef>
+          <a:effectRef idx="0">
+            <a:schemeClr val="accent1"/>
+          </a:effectRef>
+          <a:fontRef idx="minor">
+            <a:schemeClr val="lt1"/>
+          </a:fontRef>
+        </p:style>
+        <p:txBody>
+          <a:bodyPr rtlCol="0" anchor="ctr"/>
+          <a:lstStyle/>
+          <a:p>
+            <a:pPr algn="ctr"/>
+            <a:endParaRPr lang="ko-KR" altLang="en-US"/>
+          </a:p>
+        </p:txBody>
+      </p:sp>
+      <p:sp>
+        <p:nvSpPr>
+          <p:cNvPr id="20" name="직사각형 19">
+            <a:extLst>
+              <a:ext uri="{FF2B5EF4-FFF2-40B4-BE49-F238E27FC236}">
+                <a16:creationId xmlns:a16="http://schemas.microsoft.com/office/drawing/2014/main" id="{2225FD9B-5DB5-4D39-9892-50D504F62CB0}"/>
+              </a:ext>
+            </a:extLst>
+          </p:cNvPr>
+          <p:cNvSpPr/>
+          <p:nvPr/>
+        </p:nvSpPr>
+        <p:spPr>
+          <a:xfrm>
+            <a:off x="1794319" y="3380766"/>
+            <a:ext cx="443973" cy="45719"/>
+          </a:xfrm>
+          <a:prstGeom prst="rect">
+            <a:avLst/>
+          </a:prstGeom>
+        </p:spPr>
+        <p:style>
+          <a:lnRef idx="2">
+            <a:schemeClr val="accent1">
+              <a:shade val="50000"/>
+            </a:schemeClr>
+          </a:lnRef>
+          <a:fillRef idx="1">
+            <a:schemeClr val="accent1"/>
+          </a:fillRef>
+          <a:effectRef idx="0">
+            <a:schemeClr val="accent1"/>
+          </a:effectRef>
+          <a:fontRef idx="minor">
+            <a:schemeClr val="lt1"/>
+          </a:fontRef>
+        </p:style>
+        <p:txBody>
+          <a:bodyPr rtlCol="0" anchor="ctr"/>
+          <a:lstStyle/>
+          <a:p>
+            <a:pPr algn="ctr"/>
+            <a:endParaRPr lang="ko-KR" altLang="en-US"/>
+          </a:p>
+        </p:txBody>
+      </p:sp>
+      <p:sp>
+        <p:nvSpPr>
+          <p:cNvPr id="21" name="직사각형 20">
+            <a:extLst>
+              <a:ext uri="{FF2B5EF4-FFF2-40B4-BE49-F238E27FC236}">
+                <a16:creationId xmlns:a16="http://schemas.microsoft.com/office/drawing/2014/main" id="{20B05898-B0B6-48F8-B07A-BABC2E3722F3}"/>
+              </a:ext>
+            </a:extLst>
+          </p:cNvPr>
+          <p:cNvSpPr/>
+          <p:nvPr/>
+        </p:nvSpPr>
+        <p:spPr>
+          <a:xfrm>
+            <a:off x="2474143" y="3036847"/>
+            <a:ext cx="45719" cy="430253"/>
+          </a:xfrm>
+          <a:prstGeom prst="rect">
+            <a:avLst/>
+          </a:prstGeom>
+        </p:spPr>
+        <p:style>
+          <a:lnRef idx="2">
+            <a:schemeClr val="accent1">
+              <a:shade val="50000"/>
+            </a:schemeClr>
+          </a:lnRef>
+          <a:fillRef idx="1">
+            <a:schemeClr val="accent1"/>
+          </a:fillRef>
+          <a:effectRef idx="0">
+            <a:schemeClr val="accent1"/>
+          </a:effectRef>
+          <a:fontRef idx="minor">
+            <a:schemeClr val="lt1"/>
+          </a:fontRef>
+        </p:style>
+        <p:txBody>
+          <a:bodyPr rtlCol="0" anchor="ctr"/>
+          <a:lstStyle/>
+          <a:p>
+            <a:pPr algn="ctr"/>
+            <a:endParaRPr lang="ko-KR" altLang="en-US"/>
+          </a:p>
+        </p:txBody>
+      </p:sp>
+      <p:sp>
+        <p:nvSpPr>
+          <p:cNvPr id="22" name="직사각형 21">
+            <a:extLst>
+              <a:ext uri="{FF2B5EF4-FFF2-40B4-BE49-F238E27FC236}">
+                <a16:creationId xmlns:a16="http://schemas.microsoft.com/office/drawing/2014/main" id="{FAB4A78A-CAC6-4E0F-B38B-B70F0073A0BE}"/>
+              </a:ext>
+            </a:extLst>
+          </p:cNvPr>
+          <p:cNvSpPr/>
+          <p:nvPr/>
+        </p:nvSpPr>
+        <p:spPr>
+          <a:xfrm>
+            <a:off x="2107782" y="3002463"/>
+            <a:ext cx="752320" cy="45719"/>
+          </a:xfrm>
+          <a:prstGeom prst="rect">
+            <a:avLst/>
+          </a:prstGeom>
+        </p:spPr>
+        <p:style>
+          <a:lnRef idx="2">
+            <a:schemeClr val="accent1">
+              <a:shade val="50000"/>
+            </a:schemeClr>
+          </a:lnRef>
+          <a:fillRef idx="1">
+            <a:schemeClr val="accent1"/>
+          </a:fillRef>
+          <a:effectRef idx="0">
+            <a:schemeClr val="accent1"/>
+          </a:effectRef>
+          <a:fontRef idx="minor">
+            <a:schemeClr val="lt1"/>
+          </a:fontRef>
+        </p:style>
+        <p:txBody>
+          <a:bodyPr rtlCol="0" anchor="ctr"/>
+          <a:lstStyle/>
+          <a:p>
+            <a:pPr algn="ctr"/>
+            <a:endParaRPr lang="ko-KR" altLang="en-US"/>
+          </a:p>
+        </p:txBody>
+      </p:sp>
+      <p:sp>
+        <p:nvSpPr>
+          <p:cNvPr id="23" name="직사각형 22">
+            <a:extLst>
+              <a:ext uri="{FF2B5EF4-FFF2-40B4-BE49-F238E27FC236}">
+                <a16:creationId xmlns:a16="http://schemas.microsoft.com/office/drawing/2014/main" id="{AC4DCF54-4FFB-48DE-A188-FA4967E9BEC7}"/>
+              </a:ext>
+            </a:extLst>
+          </p:cNvPr>
+          <p:cNvSpPr/>
+          <p:nvPr/>
+        </p:nvSpPr>
+        <p:spPr>
+          <a:xfrm>
+            <a:off x="2109833" y="2362932"/>
+            <a:ext cx="748218" cy="386761"/>
+          </a:xfrm>
+          <a:prstGeom prst="rect">
+            <a:avLst/>
+          </a:prstGeom>
+          <a:noFill/>
+          <a:ln w="28575">
+            <a:solidFill>
+              <a:schemeClr val="tx1"/>
+            </a:solidFill>
+          </a:ln>
+        </p:spPr>
+        <p:style>
+          <a:lnRef idx="2">
+            <a:schemeClr val="accent1">
+              <a:shade val="50000"/>
+            </a:schemeClr>
+          </a:lnRef>
+          <a:fillRef idx="1">
+            <a:schemeClr val="accent1"/>
+          </a:fillRef>
+          <a:effectRef idx="0">
+            <a:schemeClr val="accent1"/>
+          </a:effectRef>
+          <a:fontRef idx="minor">
+            <a:schemeClr val="lt1"/>
+          </a:fontRef>
+        </p:style>
+        <p:txBody>
+          <a:bodyPr rtlCol="0" anchor="ctr"/>
+          <a:lstStyle/>
+          <a:p>
+            <a:pPr algn="ctr"/>
+            <a:endParaRPr lang="ko-KR" altLang="en-US"/>
+          </a:p>
+        </p:txBody>
+      </p:sp>
+      <p:sp>
+        <p:nvSpPr>
+          <p:cNvPr id="24" name="직사각형 23">
+            <a:extLst>
+              <a:ext uri="{FF2B5EF4-FFF2-40B4-BE49-F238E27FC236}">
+                <a16:creationId xmlns:a16="http://schemas.microsoft.com/office/drawing/2014/main" id="{92A276A7-8E0F-4616-AB88-9EB0A9A298D6}"/>
+              </a:ext>
+            </a:extLst>
+          </p:cNvPr>
+          <p:cNvSpPr/>
+          <p:nvPr/>
+        </p:nvSpPr>
+        <p:spPr>
+          <a:xfrm>
+            <a:off x="1378285" y="1629000"/>
+            <a:ext cx="45719" cy="1080000"/>
+          </a:xfrm>
+          <a:prstGeom prst="rect">
+            <a:avLst/>
+          </a:prstGeom>
+        </p:spPr>
+        <p:style>
+          <a:lnRef idx="2">
+            <a:schemeClr val="accent1">
+              <a:shade val="50000"/>
+            </a:schemeClr>
+          </a:lnRef>
+          <a:fillRef idx="1">
+            <a:schemeClr val="accent1"/>
+          </a:fillRef>
+          <a:effectRef idx="0">
+            <a:schemeClr val="accent1"/>
+          </a:effectRef>
+          <a:fontRef idx="minor">
+            <a:schemeClr val="lt1"/>
+          </a:fontRef>
+        </p:style>
+        <p:txBody>
+          <a:bodyPr rtlCol="0" anchor="ctr"/>
+          <a:lstStyle/>
+          <a:p>
+            <a:pPr algn="ctr"/>
+            <a:endParaRPr lang="ko-KR" altLang="en-US"/>
+          </a:p>
+        </p:txBody>
+      </p:sp>
+      <p:sp>
+        <p:nvSpPr>
+          <p:cNvPr id="25" name="직사각형 24">
+            <a:extLst>
+              <a:ext uri="{FF2B5EF4-FFF2-40B4-BE49-F238E27FC236}">
+                <a16:creationId xmlns:a16="http://schemas.microsoft.com/office/drawing/2014/main" id="{7A311AD0-4C14-4E0B-B9B2-7F2D496B72D8}"/>
+              </a:ext>
+            </a:extLst>
+          </p:cNvPr>
+          <p:cNvSpPr/>
+          <p:nvPr/>
+        </p:nvSpPr>
+        <p:spPr>
+          <a:xfrm>
+            <a:off x="1401144" y="2349000"/>
+            <a:ext cx="383399" cy="45719"/>
+          </a:xfrm>
+          <a:prstGeom prst="rect">
+            <a:avLst/>
+          </a:prstGeom>
+        </p:spPr>
+        <p:style>
+          <a:lnRef idx="2">
+            <a:schemeClr val="accent1">
+              <a:shade val="50000"/>
+            </a:schemeClr>
+          </a:lnRef>
+          <a:fillRef idx="1">
+            <a:schemeClr val="accent1"/>
+          </a:fillRef>
+          <a:effectRef idx="0">
+            <a:schemeClr val="accent1"/>
+          </a:effectRef>
+          <a:fontRef idx="minor">
+            <a:schemeClr val="lt1"/>
+          </a:fontRef>
+        </p:style>
+        <p:txBody>
+          <a:bodyPr rtlCol="0" anchor="ctr"/>
+          <a:lstStyle/>
+          <a:p>
+            <a:pPr algn="ctr"/>
+            <a:endParaRPr lang="ko-KR" altLang="en-US"/>
+          </a:p>
+        </p:txBody>
+      </p:sp>
+      <p:sp>
+        <p:nvSpPr>
+          <p:cNvPr id="26" name="직사각형 25">
+            <a:extLst>
+              <a:ext uri="{FF2B5EF4-FFF2-40B4-BE49-F238E27FC236}">
+                <a16:creationId xmlns:a16="http://schemas.microsoft.com/office/drawing/2014/main" id="{445F2D96-E908-49D3-8113-205D0BCD0879}"/>
+              </a:ext>
+            </a:extLst>
+          </p:cNvPr>
+          <p:cNvSpPr/>
+          <p:nvPr/>
+        </p:nvSpPr>
+        <p:spPr>
+          <a:xfrm>
+            <a:off x="1784543" y="1989000"/>
+            <a:ext cx="359461" cy="45719"/>
+          </a:xfrm>
+          <a:prstGeom prst="rect">
+            <a:avLst/>
+          </a:prstGeom>
+        </p:spPr>
+        <p:style>
+          <a:lnRef idx="2">
+            <a:schemeClr val="accent1">
+              <a:shade val="50000"/>
+            </a:schemeClr>
+          </a:lnRef>
+          <a:fillRef idx="1">
+            <a:schemeClr val="accent1"/>
+          </a:fillRef>
+          <a:effectRef idx="0">
+            <a:schemeClr val="accent1"/>
+          </a:effectRef>
+          <a:fontRef idx="minor">
+            <a:schemeClr val="lt1"/>
+          </a:fontRef>
+        </p:style>
+        <p:txBody>
+          <a:bodyPr rtlCol="0" anchor="ctr"/>
+          <a:lstStyle/>
+          <a:p>
+            <a:pPr algn="ctr"/>
+            <a:endParaRPr lang="ko-KR" altLang="en-US"/>
+          </a:p>
+        </p:txBody>
+      </p:sp>
+      <p:sp>
+        <p:nvSpPr>
+          <p:cNvPr id="28" name="직사각형 27">
+            <a:extLst>
+              <a:ext uri="{FF2B5EF4-FFF2-40B4-BE49-F238E27FC236}">
+                <a16:creationId xmlns:a16="http://schemas.microsoft.com/office/drawing/2014/main" id="{AAD24095-7DB5-4853-82FB-689678124447}"/>
+              </a:ext>
+            </a:extLst>
+          </p:cNvPr>
+          <p:cNvSpPr/>
+          <p:nvPr/>
+        </p:nvSpPr>
+        <p:spPr>
+          <a:xfrm>
+            <a:off x="3550409" y="1629000"/>
+            <a:ext cx="45719" cy="1080000"/>
+          </a:xfrm>
+          <a:prstGeom prst="rect">
+            <a:avLst/>
+          </a:prstGeom>
+        </p:spPr>
+        <p:style>
+          <a:lnRef idx="2">
+            <a:schemeClr val="accent1">
+              <a:shade val="50000"/>
+            </a:schemeClr>
+          </a:lnRef>
+          <a:fillRef idx="1">
+            <a:schemeClr val="accent1"/>
+          </a:fillRef>
+          <a:effectRef idx="0">
+            <a:schemeClr val="accent1"/>
+          </a:effectRef>
+          <a:fontRef idx="minor">
+            <a:schemeClr val="lt1"/>
+          </a:fontRef>
+        </p:style>
+        <p:txBody>
+          <a:bodyPr rtlCol="0" anchor="ctr"/>
+          <a:lstStyle/>
+          <a:p>
+            <a:pPr algn="ctr"/>
+            <a:endParaRPr lang="ko-KR" altLang="en-US"/>
+          </a:p>
+        </p:txBody>
+      </p:sp>
+      <p:sp>
+        <p:nvSpPr>
+          <p:cNvPr id="29" name="직사각형 28">
+            <a:extLst>
+              <a:ext uri="{FF2B5EF4-FFF2-40B4-BE49-F238E27FC236}">
+                <a16:creationId xmlns:a16="http://schemas.microsoft.com/office/drawing/2014/main" id="{DBFD871B-2022-4D69-84C6-C4B2196C3EE4}"/>
+              </a:ext>
+            </a:extLst>
+          </p:cNvPr>
+          <p:cNvSpPr/>
+          <p:nvPr/>
+        </p:nvSpPr>
+        <p:spPr>
+          <a:xfrm>
+            <a:off x="3207921" y="2362932"/>
+            <a:ext cx="359461" cy="45719"/>
+          </a:xfrm>
+          <a:prstGeom prst="rect">
+            <a:avLst/>
+          </a:prstGeom>
+        </p:spPr>
+        <p:style>
+          <a:lnRef idx="2">
+            <a:schemeClr val="accent1">
+              <a:shade val="50000"/>
+            </a:schemeClr>
+          </a:lnRef>
+          <a:fillRef idx="1">
+            <a:schemeClr val="accent1"/>
+          </a:fillRef>
+          <a:effectRef idx="0">
+            <a:schemeClr val="accent1"/>
+          </a:effectRef>
+          <a:fontRef idx="minor">
+            <a:schemeClr val="lt1"/>
+          </a:fontRef>
+        </p:style>
+        <p:txBody>
+          <a:bodyPr rtlCol="0" anchor="ctr"/>
+          <a:lstStyle/>
+          <a:p>
+            <a:pPr algn="ctr"/>
+            <a:endParaRPr lang="ko-KR" altLang="en-US"/>
+          </a:p>
+        </p:txBody>
+      </p:sp>
+      <p:sp>
+        <p:nvSpPr>
+          <p:cNvPr id="30" name="직사각형 29">
+            <a:extLst>
+              <a:ext uri="{FF2B5EF4-FFF2-40B4-BE49-F238E27FC236}">
+                <a16:creationId xmlns:a16="http://schemas.microsoft.com/office/drawing/2014/main" id="{F543F469-E2C1-44E7-9922-D19CF44465E4}"/>
+              </a:ext>
+            </a:extLst>
+          </p:cNvPr>
+          <p:cNvSpPr/>
+          <p:nvPr/>
+        </p:nvSpPr>
+        <p:spPr>
+          <a:xfrm>
+            <a:off x="2839974" y="1966140"/>
+            <a:ext cx="359461" cy="45719"/>
+          </a:xfrm>
+          <a:prstGeom prst="rect">
+            <a:avLst/>
+          </a:prstGeom>
+        </p:spPr>
+        <p:style>
+          <a:lnRef idx="2">
+            <a:schemeClr val="accent1">
+              <a:shade val="50000"/>
+            </a:schemeClr>
+          </a:lnRef>
+          <a:fillRef idx="1">
+            <a:schemeClr val="accent1"/>
+          </a:fillRef>
+          <a:effectRef idx="0">
+            <a:schemeClr val="accent1"/>
+          </a:effectRef>
+          <a:fontRef idx="minor">
+            <a:schemeClr val="lt1"/>
+          </a:fontRef>
+        </p:style>
+        <p:txBody>
+          <a:bodyPr rtlCol="0" anchor="ctr"/>
+          <a:lstStyle/>
+          <a:p>
+            <a:pPr algn="ctr"/>
+            <a:endParaRPr lang="ko-KR" altLang="en-US"/>
+          </a:p>
+        </p:txBody>
+      </p:sp>
+      <p:sp>
+        <p:nvSpPr>
+          <p:cNvPr id="31" name="직사각형 30">
+            <a:extLst>
+              <a:ext uri="{FF2B5EF4-FFF2-40B4-BE49-F238E27FC236}">
+                <a16:creationId xmlns:a16="http://schemas.microsoft.com/office/drawing/2014/main" id="{E3AFC922-E525-4B92-9D2C-E866FBCD64A0}"/>
+              </a:ext>
+            </a:extLst>
+          </p:cNvPr>
+          <p:cNvSpPr/>
+          <p:nvPr/>
+        </p:nvSpPr>
+        <p:spPr>
+          <a:xfrm>
+            <a:off x="710922" y="2689475"/>
+            <a:ext cx="359461" cy="45719"/>
+          </a:xfrm>
+          <a:prstGeom prst="rect">
+            <a:avLst/>
+          </a:prstGeom>
+        </p:spPr>
+        <p:style>
+          <a:lnRef idx="2">
+            <a:schemeClr val="accent1">
+              <a:shade val="50000"/>
+            </a:schemeClr>
+          </a:lnRef>
+          <a:fillRef idx="1">
+            <a:schemeClr val="accent1"/>
+          </a:fillRef>
+          <a:effectRef idx="0">
+            <a:schemeClr val="accent1"/>
+          </a:effectRef>
+          <a:fontRef idx="minor">
+            <a:schemeClr val="lt1"/>
+          </a:fontRef>
+        </p:style>
+        <p:txBody>
+          <a:bodyPr rtlCol="0" anchor="ctr"/>
+          <a:lstStyle/>
+          <a:p>
+            <a:pPr algn="ctr"/>
+            <a:endParaRPr lang="ko-KR" altLang="en-US"/>
+          </a:p>
+        </p:txBody>
+      </p:sp>
+      <p:sp>
+        <p:nvSpPr>
+          <p:cNvPr id="32" name="직사각형 31">
+            <a:extLst>
+              <a:ext uri="{FF2B5EF4-FFF2-40B4-BE49-F238E27FC236}">
+                <a16:creationId xmlns:a16="http://schemas.microsoft.com/office/drawing/2014/main" id="{45F56B0E-C4BA-4583-8147-336D9F2E5179}"/>
+              </a:ext>
+            </a:extLst>
+          </p:cNvPr>
+          <p:cNvSpPr/>
+          <p:nvPr/>
+        </p:nvSpPr>
+        <p:spPr>
+          <a:xfrm>
+            <a:off x="3904030" y="2704536"/>
+            <a:ext cx="359461" cy="45719"/>
+          </a:xfrm>
+          <a:prstGeom prst="rect">
+            <a:avLst/>
+          </a:prstGeom>
+        </p:spPr>
+        <p:style>
+          <a:lnRef idx="2">
+            <a:schemeClr val="accent1">
+              <a:shade val="50000"/>
+            </a:schemeClr>
+          </a:lnRef>
+          <a:fillRef idx="1">
+            <a:schemeClr val="accent1"/>
+          </a:fillRef>
+          <a:effectRef idx="0">
+            <a:schemeClr val="accent1"/>
+          </a:effectRef>
+          <a:fontRef idx="minor">
+            <a:schemeClr val="lt1"/>
+          </a:fontRef>
+        </p:style>
+        <p:txBody>
+          <a:bodyPr rtlCol="0" anchor="ctr"/>
+          <a:lstStyle/>
+          <a:p>
+            <a:pPr algn="ctr"/>
+            <a:endParaRPr lang="ko-KR" altLang="en-US"/>
+          </a:p>
+        </p:txBody>
+      </p:sp>
+      <p:sp>
+        <p:nvSpPr>
+          <p:cNvPr id="35" name="직사각형 34">
+            <a:extLst>
+              <a:ext uri="{FF2B5EF4-FFF2-40B4-BE49-F238E27FC236}">
+                <a16:creationId xmlns:a16="http://schemas.microsoft.com/office/drawing/2014/main" id="{72B04D4E-4BBE-40D1-957B-3A5212ABA51B}"/>
+              </a:ext>
+            </a:extLst>
+          </p:cNvPr>
+          <p:cNvSpPr/>
+          <p:nvPr/>
+        </p:nvSpPr>
+        <p:spPr>
+          <a:xfrm>
+            <a:off x="1033418" y="2355669"/>
+            <a:ext cx="359461" cy="45719"/>
+          </a:xfrm>
+          <a:prstGeom prst="rect">
+            <a:avLst/>
+          </a:prstGeom>
+        </p:spPr>
+        <p:style>
+          <a:lnRef idx="2">
+            <a:schemeClr val="accent1">
+              <a:shade val="50000"/>
+            </a:schemeClr>
+          </a:lnRef>
+          <a:fillRef idx="1">
+            <a:schemeClr val="accent1"/>
+          </a:fillRef>
+          <a:effectRef idx="0">
+            <a:schemeClr val="accent1"/>
+          </a:effectRef>
+          <a:fontRef idx="minor">
+            <a:schemeClr val="lt1"/>
+          </a:fontRef>
+        </p:style>
+        <p:txBody>
+          <a:bodyPr rtlCol="0" anchor="ctr"/>
+          <a:lstStyle/>
+          <a:p>
+            <a:pPr algn="ctr"/>
+            <a:endParaRPr lang="ko-KR" altLang="en-US"/>
+          </a:p>
+        </p:txBody>
+      </p:sp>
+      <p:sp>
+        <p:nvSpPr>
+          <p:cNvPr id="36" name="직사각형 35">
+            <a:extLst>
+              <a:ext uri="{FF2B5EF4-FFF2-40B4-BE49-F238E27FC236}">
+                <a16:creationId xmlns:a16="http://schemas.microsoft.com/office/drawing/2014/main" id="{9CEFA349-6DA4-44C9-8F9A-8A207939BEAB}"/>
+              </a:ext>
+            </a:extLst>
+          </p:cNvPr>
+          <p:cNvSpPr/>
+          <p:nvPr/>
+        </p:nvSpPr>
+        <p:spPr>
+          <a:xfrm>
+            <a:off x="3596128" y="2362159"/>
+            <a:ext cx="359461" cy="45719"/>
+          </a:xfrm>
+          <a:prstGeom prst="rect">
+            <a:avLst/>
+          </a:prstGeom>
+        </p:spPr>
+        <p:style>
+          <a:lnRef idx="2">
+            <a:schemeClr val="accent1">
+              <a:shade val="50000"/>
+            </a:schemeClr>
+          </a:lnRef>
+          <a:fillRef idx="1">
+            <a:schemeClr val="accent1"/>
+          </a:fillRef>
+          <a:effectRef idx="0">
+            <a:schemeClr val="accent1"/>
+          </a:effectRef>
+          <a:fontRef idx="minor">
+            <a:schemeClr val="lt1"/>
+          </a:fontRef>
+        </p:style>
+        <p:txBody>
+          <a:bodyPr rtlCol="0" anchor="ctr"/>
+          <a:lstStyle/>
+          <a:p>
+            <a:pPr algn="ctr"/>
+            <a:endParaRPr lang="ko-KR" altLang="en-US"/>
+          </a:p>
+        </p:txBody>
+      </p:sp>
+      <p:sp>
+        <p:nvSpPr>
+          <p:cNvPr id="37" name="직사각형 36">
+            <a:extLst>
+              <a:ext uri="{FF2B5EF4-FFF2-40B4-BE49-F238E27FC236}">
+                <a16:creationId xmlns:a16="http://schemas.microsoft.com/office/drawing/2014/main" id="{605062B5-6CB2-43F9-B7FC-E9A3F752E237}"/>
+              </a:ext>
+            </a:extLst>
+          </p:cNvPr>
+          <p:cNvSpPr/>
+          <p:nvPr/>
+        </p:nvSpPr>
+        <p:spPr>
+          <a:xfrm>
+            <a:off x="692215" y="1976906"/>
+            <a:ext cx="359461" cy="45719"/>
+          </a:xfrm>
+          <a:prstGeom prst="rect">
+            <a:avLst/>
+          </a:prstGeom>
+        </p:spPr>
+        <p:style>
+          <a:lnRef idx="2">
+            <a:schemeClr val="accent1">
+              <a:shade val="50000"/>
+            </a:schemeClr>
+          </a:lnRef>
+          <a:fillRef idx="1">
+            <a:schemeClr val="accent1"/>
+          </a:fillRef>
+          <a:effectRef idx="0">
+            <a:schemeClr val="accent1"/>
+          </a:effectRef>
+          <a:fontRef idx="minor">
+            <a:schemeClr val="lt1"/>
+          </a:fontRef>
+        </p:style>
+        <p:txBody>
+          <a:bodyPr rtlCol="0" anchor="ctr"/>
+          <a:lstStyle/>
+          <a:p>
+            <a:pPr algn="ctr"/>
+            <a:endParaRPr lang="ko-KR" altLang="en-US"/>
+          </a:p>
+        </p:txBody>
+      </p:sp>
+      <p:sp>
+        <p:nvSpPr>
+          <p:cNvPr id="38" name="직사각형 37">
+            <a:extLst>
+              <a:ext uri="{FF2B5EF4-FFF2-40B4-BE49-F238E27FC236}">
+                <a16:creationId xmlns:a16="http://schemas.microsoft.com/office/drawing/2014/main" id="{FA01D0D4-5FBD-4307-8582-5697045CA15D}"/>
+              </a:ext>
+            </a:extLst>
+          </p:cNvPr>
+          <p:cNvSpPr/>
+          <p:nvPr/>
+        </p:nvSpPr>
+        <p:spPr>
+          <a:xfrm>
+            <a:off x="3923987" y="1949860"/>
+            <a:ext cx="359461" cy="45719"/>
+          </a:xfrm>
+          <a:prstGeom prst="rect">
+            <a:avLst/>
+          </a:prstGeom>
+        </p:spPr>
+        <p:style>
+          <a:lnRef idx="2">
+            <a:schemeClr val="accent1">
+              <a:shade val="50000"/>
+            </a:schemeClr>
+          </a:lnRef>
+          <a:fillRef idx="1">
+            <a:schemeClr val="accent1"/>
+          </a:fillRef>
+          <a:effectRef idx="0">
+            <a:schemeClr val="accent1"/>
+          </a:effectRef>
+          <a:fontRef idx="minor">
+            <a:schemeClr val="lt1"/>
+          </a:fontRef>
+        </p:style>
+        <p:txBody>
+          <a:bodyPr rtlCol="0" anchor="ctr"/>
+          <a:lstStyle/>
+          <a:p>
+            <a:pPr algn="ctr"/>
+            <a:endParaRPr lang="ko-KR" altLang="en-US"/>
+          </a:p>
+        </p:txBody>
+      </p:sp>
+      <p:sp>
+        <p:nvSpPr>
+          <p:cNvPr id="39" name="직사각형 38">
+            <a:extLst>
+              <a:ext uri="{FF2B5EF4-FFF2-40B4-BE49-F238E27FC236}">
+                <a16:creationId xmlns:a16="http://schemas.microsoft.com/office/drawing/2014/main" id="{2BB86C16-D8E8-4ACC-831F-DDE9227FC3FD}"/>
+              </a:ext>
+            </a:extLst>
+          </p:cNvPr>
+          <p:cNvSpPr/>
+          <p:nvPr/>
+        </p:nvSpPr>
+        <p:spPr>
+          <a:xfrm>
+            <a:off x="2132240" y="1608182"/>
+            <a:ext cx="757650" cy="66537"/>
+          </a:xfrm>
+          <a:prstGeom prst="rect">
+            <a:avLst/>
+          </a:prstGeom>
+        </p:spPr>
+        <p:style>
+          <a:lnRef idx="2">
+            <a:schemeClr val="accent1">
+              <a:shade val="50000"/>
+            </a:schemeClr>
+          </a:lnRef>
+          <a:fillRef idx="1">
+            <a:schemeClr val="accent1"/>
+          </a:fillRef>
+          <a:effectRef idx="0">
+            <a:schemeClr val="accent1"/>
+          </a:effectRef>
+          <a:fontRef idx="minor">
+            <a:schemeClr val="lt1"/>
+          </a:fontRef>
+        </p:style>
+        <p:txBody>
+          <a:bodyPr rtlCol="0" anchor="ctr"/>
+          <a:lstStyle/>
+          <a:p>
+            <a:pPr algn="ctr"/>
+            <a:endParaRPr lang="ko-KR" altLang="en-US"/>
+          </a:p>
+        </p:txBody>
+      </p:sp>
+      <p:sp>
+        <p:nvSpPr>
+          <p:cNvPr id="40" name="직사각형 39">
+            <a:extLst>
+              <a:ext uri="{FF2B5EF4-FFF2-40B4-BE49-F238E27FC236}">
+                <a16:creationId xmlns:a16="http://schemas.microsoft.com/office/drawing/2014/main" id="{F9604910-24CC-43EC-97AD-15CA644576A1}"/>
+              </a:ext>
+            </a:extLst>
+          </p:cNvPr>
+          <p:cNvSpPr/>
+          <p:nvPr/>
+        </p:nvSpPr>
+        <p:spPr>
+          <a:xfrm>
+            <a:off x="2497002" y="1680286"/>
+            <a:ext cx="45719" cy="360000"/>
+          </a:xfrm>
+          <a:prstGeom prst="rect">
+            <a:avLst/>
+          </a:prstGeom>
+        </p:spPr>
+        <p:style>
+          <a:lnRef idx="2">
+            <a:schemeClr val="accent1">
+              <a:shade val="50000"/>
+            </a:schemeClr>
+          </a:lnRef>
+          <a:fillRef idx="1">
+            <a:schemeClr val="accent1"/>
+          </a:fillRef>
+          <a:effectRef idx="0">
+            <a:schemeClr val="accent1"/>
+          </a:effectRef>
+          <a:fontRef idx="minor">
+            <a:schemeClr val="lt1"/>
+          </a:fontRef>
+        </p:style>
+        <p:txBody>
+          <a:bodyPr rtlCol="0" anchor="ctr"/>
+          <a:lstStyle/>
+          <a:p>
+            <a:pPr algn="ctr"/>
+            <a:endParaRPr lang="ko-KR" altLang="en-US"/>
+          </a:p>
+        </p:txBody>
+      </p:sp>
+      <p:sp>
+        <p:nvSpPr>
+          <p:cNvPr id="41" name="직사각형 40">
+            <a:extLst>
+              <a:ext uri="{FF2B5EF4-FFF2-40B4-BE49-F238E27FC236}">
+                <a16:creationId xmlns:a16="http://schemas.microsoft.com/office/drawing/2014/main" id="{2D7B5E93-405A-4792-9411-5CEE55797944}"/>
+              </a:ext>
+            </a:extLst>
+          </p:cNvPr>
+          <p:cNvSpPr/>
+          <p:nvPr/>
+        </p:nvSpPr>
+        <p:spPr>
+          <a:xfrm>
+            <a:off x="1384969" y="1233962"/>
+            <a:ext cx="757650" cy="66537"/>
+          </a:xfrm>
+          <a:prstGeom prst="rect">
+            <a:avLst/>
+          </a:prstGeom>
+        </p:spPr>
+        <p:style>
+          <a:lnRef idx="2">
+            <a:schemeClr val="accent1">
+              <a:shade val="50000"/>
+            </a:schemeClr>
+          </a:lnRef>
+          <a:fillRef idx="1">
+            <a:schemeClr val="accent1"/>
+          </a:fillRef>
+          <a:effectRef idx="0">
+            <a:schemeClr val="accent1"/>
+          </a:effectRef>
+          <a:fontRef idx="minor">
+            <a:schemeClr val="lt1"/>
+          </a:fontRef>
+        </p:style>
+        <p:txBody>
+          <a:bodyPr rtlCol="0" anchor="ctr"/>
+          <a:lstStyle/>
+          <a:p>
+            <a:pPr algn="ctr"/>
+            <a:endParaRPr lang="ko-KR" altLang="en-US"/>
+          </a:p>
+        </p:txBody>
+      </p:sp>
+      <p:sp>
+        <p:nvSpPr>
+          <p:cNvPr id="42" name="직사각형 41">
+            <a:extLst>
+              <a:ext uri="{FF2B5EF4-FFF2-40B4-BE49-F238E27FC236}">
+                <a16:creationId xmlns:a16="http://schemas.microsoft.com/office/drawing/2014/main" id="{78E5B586-6FC5-4AE6-93E5-AACE32AE866F}"/>
+              </a:ext>
+            </a:extLst>
+          </p:cNvPr>
+          <p:cNvSpPr/>
+          <p:nvPr/>
+        </p:nvSpPr>
+        <p:spPr>
+          <a:xfrm>
+            <a:off x="1749731" y="1306066"/>
+            <a:ext cx="45719" cy="360000"/>
+          </a:xfrm>
+          <a:prstGeom prst="rect">
+            <a:avLst/>
+          </a:prstGeom>
+        </p:spPr>
+        <p:style>
+          <a:lnRef idx="2">
+            <a:schemeClr val="accent1">
+              <a:shade val="50000"/>
+            </a:schemeClr>
+          </a:lnRef>
+          <a:fillRef idx="1">
+            <a:schemeClr val="accent1"/>
+          </a:fillRef>
+          <a:effectRef idx="0">
+            <a:schemeClr val="accent1"/>
+          </a:effectRef>
+          <a:fontRef idx="minor">
+            <a:schemeClr val="lt1"/>
+          </a:fontRef>
+        </p:style>
+        <p:txBody>
+          <a:bodyPr rtlCol="0" anchor="ctr"/>
+          <a:lstStyle/>
+          <a:p>
+            <a:pPr algn="ctr"/>
+            <a:endParaRPr lang="ko-KR" altLang="en-US"/>
+          </a:p>
+        </p:txBody>
+      </p:sp>
+      <p:sp>
+        <p:nvSpPr>
+          <p:cNvPr id="43" name="직사각형 42">
+            <a:extLst>
+              <a:ext uri="{FF2B5EF4-FFF2-40B4-BE49-F238E27FC236}">
+                <a16:creationId xmlns:a16="http://schemas.microsoft.com/office/drawing/2014/main" id="{0ED9D002-D32B-42EB-A053-8C3EA5238CBD}"/>
+              </a:ext>
+            </a:extLst>
+          </p:cNvPr>
+          <p:cNvSpPr/>
+          <p:nvPr/>
+        </p:nvSpPr>
+        <p:spPr>
+          <a:xfrm>
+            <a:off x="2840040" y="1225563"/>
+            <a:ext cx="757650" cy="66537"/>
+          </a:xfrm>
+          <a:prstGeom prst="rect">
+            <a:avLst/>
+          </a:prstGeom>
+        </p:spPr>
+        <p:style>
+          <a:lnRef idx="2">
+            <a:schemeClr val="accent1">
+              <a:shade val="50000"/>
+            </a:schemeClr>
+          </a:lnRef>
+          <a:fillRef idx="1">
+            <a:schemeClr val="accent1"/>
+          </a:fillRef>
+          <a:effectRef idx="0">
+            <a:schemeClr val="accent1"/>
+          </a:effectRef>
+          <a:fontRef idx="minor">
+            <a:schemeClr val="lt1"/>
+          </a:fontRef>
+        </p:style>
+        <p:txBody>
+          <a:bodyPr rtlCol="0" anchor="ctr"/>
+          <a:lstStyle/>
+          <a:p>
+            <a:pPr algn="ctr"/>
+            <a:endParaRPr lang="ko-KR" altLang="en-US"/>
+          </a:p>
+        </p:txBody>
+      </p:sp>
+      <p:sp>
+        <p:nvSpPr>
+          <p:cNvPr id="44" name="직사각형 43">
+            <a:extLst>
+              <a:ext uri="{FF2B5EF4-FFF2-40B4-BE49-F238E27FC236}">
+                <a16:creationId xmlns:a16="http://schemas.microsoft.com/office/drawing/2014/main" id="{379F5A92-D5A4-4597-8069-CF4A75B5865B}"/>
+              </a:ext>
+            </a:extLst>
+          </p:cNvPr>
+          <p:cNvSpPr/>
+          <p:nvPr/>
+        </p:nvSpPr>
+        <p:spPr>
+          <a:xfrm>
+            <a:off x="3204802" y="1297667"/>
+            <a:ext cx="45719" cy="360000"/>
+          </a:xfrm>
+          <a:prstGeom prst="rect">
+            <a:avLst/>
+          </a:prstGeom>
+        </p:spPr>
+        <p:style>
+          <a:lnRef idx="2">
+            <a:schemeClr val="accent1">
+              <a:shade val="50000"/>
+            </a:schemeClr>
+          </a:lnRef>
+          <a:fillRef idx="1">
+            <a:schemeClr val="accent1"/>
+          </a:fillRef>
+          <a:effectRef idx="0">
+            <a:schemeClr val="accent1"/>
+          </a:effectRef>
+          <a:fontRef idx="minor">
+            <a:schemeClr val="lt1"/>
+          </a:fontRef>
+        </p:style>
+        <p:txBody>
+          <a:bodyPr rtlCol="0" anchor="ctr"/>
+          <a:lstStyle/>
+          <a:p>
+            <a:pPr algn="ctr"/>
+            <a:endParaRPr lang="ko-KR" altLang="en-US"/>
+          </a:p>
+        </p:txBody>
+      </p:sp>
+      <p:sp>
+        <p:nvSpPr>
+          <p:cNvPr id="45" name="직사각형 44">
+            <a:extLst>
+              <a:ext uri="{FF2B5EF4-FFF2-40B4-BE49-F238E27FC236}">
+                <a16:creationId xmlns:a16="http://schemas.microsoft.com/office/drawing/2014/main" id="{32AB1BA8-A0F4-4BF9-94AA-E38F55146DA7}"/>
+              </a:ext>
+            </a:extLst>
+          </p:cNvPr>
+          <p:cNvSpPr/>
+          <p:nvPr/>
+        </p:nvSpPr>
+        <p:spPr>
+          <a:xfrm>
+            <a:off x="3904740" y="1252267"/>
+            <a:ext cx="45719" cy="360000"/>
+          </a:xfrm>
+          <a:prstGeom prst="rect">
+            <a:avLst/>
+          </a:prstGeom>
+        </p:spPr>
+        <p:style>
+          <a:lnRef idx="2">
+            <a:schemeClr val="accent1">
+              <a:shade val="50000"/>
+            </a:schemeClr>
+          </a:lnRef>
+          <a:fillRef idx="1">
+            <a:schemeClr val="accent1"/>
+          </a:fillRef>
+          <a:effectRef idx="0">
+            <a:schemeClr val="accent1"/>
+          </a:effectRef>
+          <a:fontRef idx="minor">
+            <a:schemeClr val="lt1"/>
+          </a:fontRef>
+        </p:style>
+        <p:txBody>
+          <a:bodyPr rtlCol="0" anchor="ctr"/>
+          <a:lstStyle/>
+          <a:p>
+            <a:pPr algn="ctr"/>
+            <a:endParaRPr lang="ko-KR" altLang="en-US"/>
+          </a:p>
+        </p:txBody>
+      </p:sp>
+      <p:sp>
+        <p:nvSpPr>
+          <p:cNvPr id="46" name="직사각형 45">
+            <a:extLst>
+              <a:ext uri="{FF2B5EF4-FFF2-40B4-BE49-F238E27FC236}">
+                <a16:creationId xmlns:a16="http://schemas.microsoft.com/office/drawing/2014/main" id="{9F6C9851-885C-4FA4-929B-ABC5C53802DE}"/>
+              </a:ext>
+            </a:extLst>
+          </p:cNvPr>
+          <p:cNvSpPr/>
+          <p:nvPr/>
+        </p:nvSpPr>
+        <p:spPr>
+          <a:xfrm>
+            <a:off x="1047523" y="1237193"/>
+            <a:ext cx="45719" cy="360000"/>
+          </a:xfrm>
+          <a:prstGeom prst="rect">
+            <a:avLst/>
+          </a:prstGeom>
+        </p:spPr>
+        <p:style>
+          <a:lnRef idx="2">
+            <a:schemeClr val="accent1">
+              <a:shade val="50000"/>
+            </a:schemeClr>
+          </a:lnRef>
+          <a:fillRef idx="1">
+            <a:schemeClr val="accent1"/>
+          </a:fillRef>
+          <a:effectRef idx="0">
+            <a:schemeClr val="accent1"/>
+          </a:effectRef>
+          <a:fontRef idx="minor">
+            <a:schemeClr val="lt1"/>
+          </a:fontRef>
+        </p:style>
+        <p:txBody>
+          <a:bodyPr rtlCol="0" anchor="ctr"/>
+          <a:lstStyle/>
+          <a:p>
+            <a:pPr algn="ctr"/>
+            <a:endParaRPr lang="ko-KR" altLang="en-US"/>
+          </a:p>
+        </p:txBody>
+      </p:sp>
+      <p:sp>
+        <p:nvSpPr>
+          <p:cNvPr id="2" name="TextBox 1">
+            <a:extLst>
+              <a:ext uri="{FF2B5EF4-FFF2-40B4-BE49-F238E27FC236}">
+                <a16:creationId xmlns:a16="http://schemas.microsoft.com/office/drawing/2014/main" id="{2B761342-8050-4C66-8238-8E69BEB423BF}"/>
+              </a:ext>
+            </a:extLst>
+          </p:cNvPr>
+          <p:cNvSpPr txBox="1"/>
+          <p:nvPr/>
+        </p:nvSpPr>
+        <p:spPr>
+          <a:xfrm>
+            <a:off x="336000" y="549000"/>
+            <a:ext cx="4320000" cy="369332"/>
+          </a:xfrm>
+          <a:prstGeom prst="rect">
+            <a:avLst/>
+          </a:prstGeom>
+          <a:noFill/>
+        </p:spPr>
+        <p:txBody>
+          <a:bodyPr wrap="square" rtlCol="0">
+            <a:spAutoFit/>
+          </a:bodyPr>
+          <a:lstStyle/>
+          <a:p>
+            <a:r>
+              <a:rPr lang="en-US" altLang="ko-KR" dirty="0"/>
+              <a:t>  -5   4   3  2   1   0   1   2   3   4   5 </a:t>
+            </a:r>
+            <a:endParaRPr lang="ko-KR" altLang="en-US" dirty="0"/>
+          </a:p>
+        </p:txBody>
+      </p:sp>
+      <p:sp>
+        <p:nvSpPr>
+          <p:cNvPr id="6" name="TextBox 5">
+            <a:extLst>
+              <a:ext uri="{FF2B5EF4-FFF2-40B4-BE49-F238E27FC236}">
+                <a16:creationId xmlns:a16="http://schemas.microsoft.com/office/drawing/2014/main" id="{D7618E02-B1C1-4103-AA8A-C5C0A9FB7854}"/>
+              </a:ext>
+            </a:extLst>
+          </p:cNvPr>
+          <p:cNvSpPr txBox="1"/>
+          <p:nvPr/>
+        </p:nvSpPr>
+        <p:spPr>
+          <a:xfrm>
+            <a:off x="155173" y="552565"/>
+            <a:ext cx="461665" cy="4274281"/>
+          </a:xfrm>
+          <a:prstGeom prst="rect">
+            <a:avLst/>
+          </a:prstGeom>
+          <a:noFill/>
+        </p:spPr>
+        <p:txBody>
+          <a:bodyPr vert="eaVert" wrap="square" rtlCol="0">
+            <a:spAutoFit/>
+          </a:bodyPr>
+          <a:lstStyle/>
+          <a:p>
+            <a:r>
+              <a:rPr lang="en-US" altLang="ko-KR" dirty="0"/>
+              <a:t>   -5  -4 -3 -2  -1   0   1   2   3  4   5</a:t>
+            </a:r>
+            <a:endParaRPr lang="ko-KR" altLang="en-US" dirty="0"/>
+          </a:p>
+        </p:txBody>
+      </p:sp>
+      <p:sp>
+        <p:nvSpPr>
+          <p:cNvPr id="47" name="직사각형 46">
+            <a:extLst>
+              <a:ext uri="{FF2B5EF4-FFF2-40B4-BE49-F238E27FC236}">
+                <a16:creationId xmlns:a16="http://schemas.microsoft.com/office/drawing/2014/main" id="{00209665-C3B4-42ED-B71D-7856E8E049AC}"/>
+              </a:ext>
+            </a:extLst>
+          </p:cNvPr>
+          <p:cNvSpPr/>
+          <p:nvPr/>
+        </p:nvSpPr>
+        <p:spPr>
+          <a:xfrm>
+            <a:off x="3204803" y="2713739"/>
+            <a:ext cx="154894" cy="139197"/>
+          </a:xfrm>
+          <a:prstGeom prst="rect">
+            <a:avLst/>
+          </a:prstGeom>
+          <a:solidFill>
+            <a:srgbClr val="FF0000"/>
+          </a:solidFill>
+        </p:spPr>
+        <p:style>
+          <a:lnRef idx="2">
+            <a:schemeClr val="accent1">
+              <a:shade val="50000"/>
+            </a:schemeClr>
+          </a:lnRef>
+          <a:fillRef idx="1">
+            <a:schemeClr val="accent1"/>
+          </a:fillRef>
+          <a:effectRef idx="0">
+            <a:schemeClr val="accent1"/>
+          </a:effectRef>
+          <a:fontRef idx="minor">
+            <a:schemeClr val="lt1"/>
+          </a:fontRef>
+        </p:style>
+        <p:txBody>
+          <a:bodyPr rtlCol="0" anchor="ctr"/>
+          <a:lstStyle/>
+          <a:p>
+            <a:pPr algn="ctr"/>
+            <a:endParaRPr lang="ko-KR" altLang="en-US"/>
+          </a:p>
+        </p:txBody>
+      </p:sp>
+      <p:sp>
+        <p:nvSpPr>
+          <p:cNvPr id="48" name="직사각형 47">
+            <a:extLst>
+              <a:ext uri="{FF2B5EF4-FFF2-40B4-BE49-F238E27FC236}">
+                <a16:creationId xmlns:a16="http://schemas.microsoft.com/office/drawing/2014/main" id="{589B0A2F-77DC-4031-90E5-0F9BBDB5A799}"/>
+              </a:ext>
+            </a:extLst>
+          </p:cNvPr>
+          <p:cNvSpPr/>
+          <p:nvPr/>
+        </p:nvSpPr>
+        <p:spPr>
+          <a:xfrm>
+            <a:off x="1629649" y="2713739"/>
+            <a:ext cx="154894" cy="139197"/>
+          </a:xfrm>
+          <a:prstGeom prst="rect">
+            <a:avLst/>
+          </a:prstGeom>
+          <a:solidFill>
+            <a:srgbClr val="FF0000"/>
+          </a:solidFill>
+        </p:spPr>
+        <p:style>
+          <a:lnRef idx="2">
+            <a:schemeClr val="accent1">
+              <a:shade val="50000"/>
+            </a:schemeClr>
+          </a:lnRef>
+          <a:fillRef idx="1">
+            <a:schemeClr val="accent1"/>
+          </a:fillRef>
+          <a:effectRef idx="0">
+            <a:schemeClr val="accent1"/>
+          </a:effectRef>
+          <a:fontRef idx="minor">
+            <a:schemeClr val="lt1"/>
+          </a:fontRef>
+        </p:style>
+        <p:txBody>
+          <a:bodyPr rtlCol="0" anchor="ctr"/>
+          <a:lstStyle/>
+          <a:p>
+            <a:pPr algn="ctr"/>
+            <a:endParaRPr lang="ko-KR" altLang="en-US"/>
+          </a:p>
+        </p:txBody>
+      </p:sp>
+      <p:sp>
+        <p:nvSpPr>
+          <p:cNvPr id="49" name="직사각형 48">
+            <a:extLst>
+              <a:ext uri="{FF2B5EF4-FFF2-40B4-BE49-F238E27FC236}">
+                <a16:creationId xmlns:a16="http://schemas.microsoft.com/office/drawing/2014/main" id="{A6EEDAB5-DC4E-4D34-9A19-A88ED9D4132E}"/>
+              </a:ext>
+            </a:extLst>
+          </p:cNvPr>
+          <p:cNvSpPr/>
+          <p:nvPr/>
+        </p:nvSpPr>
+        <p:spPr>
+          <a:xfrm>
+            <a:off x="1051032" y="3435669"/>
+            <a:ext cx="154894" cy="139197"/>
+          </a:xfrm>
+          <a:prstGeom prst="rect">
+            <a:avLst/>
+          </a:prstGeom>
+          <a:solidFill>
+            <a:srgbClr val="FF0000"/>
+          </a:solidFill>
+        </p:spPr>
+        <p:style>
+          <a:lnRef idx="2">
+            <a:schemeClr val="accent1">
+              <a:shade val="50000"/>
+            </a:schemeClr>
+          </a:lnRef>
+          <a:fillRef idx="1">
+            <a:schemeClr val="accent1"/>
+          </a:fillRef>
+          <a:effectRef idx="0">
+            <a:schemeClr val="accent1"/>
+          </a:effectRef>
+          <a:fontRef idx="minor">
+            <a:schemeClr val="lt1"/>
+          </a:fontRef>
+        </p:style>
+        <p:txBody>
+          <a:bodyPr rtlCol="0" anchor="ctr"/>
+          <a:lstStyle/>
+          <a:p>
+            <a:pPr algn="ctr"/>
+            <a:endParaRPr lang="ko-KR" altLang="en-US"/>
+          </a:p>
+        </p:txBody>
+      </p:sp>
+      <p:sp>
+        <p:nvSpPr>
+          <p:cNvPr id="50" name="직사각형 49">
+            <a:extLst>
+              <a:ext uri="{FF2B5EF4-FFF2-40B4-BE49-F238E27FC236}">
+                <a16:creationId xmlns:a16="http://schemas.microsoft.com/office/drawing/2014/main" id="{85255BB1-3E3F-4EA0-97C7-DDB15E1AC5C6}"/>
+              </a:ext>
+            </a:extLst>
+          </p:cNvPr>
+          <p:cNvSpPr/>
+          <p:nvPr/>
+        </p:nvSpPr>
+        <p:spPr>
+          <a:xfrm>
+            <a:off x="3769093" y="3438208"/>
+            <a:ext cx="154894" cy="139197"/>
+          </a:xfrm>
+          <a:prstGeom prst="rect">
+            <a:avLst/>
+          </a:prstGeom>
+          <a:solidFill>
+            <a:srgbClr val="FF0000"/>
+          </a:solidFill>
+        </p:spPr>
+        <p:style>
+          <a:lnRef idx="2">
+            <a:schemeClr val="accent1">
+              <a:shade val="50000"/>
+            </a:schemeClr>
+          </a:lnRef>
+          <a:fillRef idx="1">
+            <a:schemeClr val="accent1"/>
+          </a:fillRef>
+          <a:effectRef idx="0">
+            <a:schemeClr val="accent1"/>
+          </a:effectRef>
+          <a:fontRef idx="minor">
+            <a:schemeClr val="lt1"/>
+          </a:fontRef>
+        </p:style>
+        <p:txBody>
+          <a:bodyPr rtlCol="0" anchor="ctr"/>
+          <a:lstStyle/>
+          <a:p>
+            <a:pPr algn="ctr"/>
+            <a:endParaRPr lang="ko-KR" altLang="en-US"/>
+          </a:p>
+        </p:txBody>
+      </p:sp>
+      <p:sp>
+        <p:nvSpPr>
+          <p:cNvPr id="51" name="직사각형 50">
+            <a:extLst>
+              <a:ext uri="{FF2B5EF4-FFF2-40B4-BE49-F238E27FC236}">
+                <a16:creationId xmlns:a16="http://schemas.microsoft.com/office/drawing/2014/main" id="{D4E015A1-0350-4F13-9899-76C3391D2BDB}"/>
+              </a:ext>
+            </a:extLst>
+          </p:cNvPr>
+          <p:cNvSpPr/>
+          <p:nvPr/>
+        </p:nvSpPr>
+        <p:spPr>
+          <a:xfrm>
+            <a:off x="1793273" y="3783064"/>
+            <a:ext cx="154894" cy="139197"/>
+          </a:xfrm>
+          <a:prstGeom prst="rect">
+            <a:avLst/>
+          </a:prstGeom>
+          <a:solidFill>
+            <a:srgbClr val="FF0000"/>
+          </a:solidFill>
+        </p:spPr>
+        <p:style>
+          <a:lnRef idx="2">
+            <a:schemeClr val="accent1">
+              <a:shade val="50000"/>
+            </a:schemeClr>
+          </a:lnRef>
+          <a:fillRef idx="1">
+            <a:schemeClr val="accent1"/>
+          </a:fillRef>
+          <a:effectRef idx="0">
+            <a:schemeClr val="accent1"/>
+          </a:effectRef>
+          <a:fontRef idx="minor">
+            <a:schemeClr val="lt1"/>
+          </a:fontRef>
+        </p:style>
+        <p:txBody>
+          <a:bodyPr rtlCol="0" anchor="ctr"/>
+          <a:lstStyle/>
+          <a:p>
+            <a:pPr algn="ctr"/>
+            <a:endParaRPr lang="ko-KR" altLang="en-US"/>
+          </a:p>
+        </p:txBody>
+      </p:sp>
+      <p:sp>
+        <p:nvSpPr>
+          <p:cNvPr id="52" name="직사각형 51">
+            <a:extLst>
+              <a:ext uri="{FF2B5EF4-FFF2-40B4-BE49-F238E27FC236}">
+                <a16:creationId xmlns:a16="http://schemas.microsoft.com/office/drawing/2014/main" id="{47648242-9536-42F5-8A86-81A2E277E58E}"/>
+              </a:ext>
+            </a:extLst>
+          </p:cNvPr>
+          <p:cNvSpPr/>
+          <p:nvPr/>
+        </p:nvSpPr>
+        <p:spPr>
+          <a:xfrm>
+            <a:off x="3089926" y="3769375"/>
+            <a:ext cx="154894" cy="139197"/>
+          </a:xfrm>
+          <a:prstGeom prst="rect">
+            <a:avLst/>
+          </a:prstGeom>
+          <a:solidFill>
+            <a:srgbClr val="FF0000"/>
+          </a:solidFill>
+        </p:spPr>
+        <p:style>
+          <a:lnRef idx="2">
+            <a:schemeClr val="accent1">
+              <a:shade val="50000"/>
+            </a:schemeClr>
+          </a:lnRef>
+          <a:fillRef idx="1">
+            <a:schemeClr val="accent1"/>
+          </a:fillRef>
+          <a:effectRef idx="0">
+            <a:schemeClr val="accent1"/>
+          </a:effectRef>
+          <a:fontRef idx="minor">
+            <a:schemeClr val="lt1"/>
+          </a:fontRef>
+        </p:style>
+        <p:txBody>
+          <a:bodyPr rtlCol="0" anchor="ctr"/>
+          <a:lstStyle/>
+          <a:p>
+            <a:pPr algn="ctr"/>
+            <a:endParaRPr lang="ko-KR" altLang="en-US"/>
+          </a:p>
+        </p:txBody>
+      </p:sp>
+      <p:sp>
+        <p:nvSpPr>
+          <p:cNvPr id="53" name="직사각형 52">
+            <a:extLst>
+              <a:ext uri="{FF2B5EF4-FFF2-40B4-BE49-F238E27FC236}">
+                <a16:creationId xmlns:a16="http://schemas.microsoft.com/office/drawing/2014/main" id="{EC1ABDE6-BD5F-4607-99EC-48DDC03352D0}"/>
+              </a:ext>
+            </a:extLst>
+          </p:cNvPr>
+          <p:cNvSpPr/>
+          <p:nvPr/>
+        </p:nvSpPr>
+        <p:spPr>
+          <a:xfrm>
+            <a:off x="3216648" y="924866"/>
+            <a:ext cx="154894" cy="139197"/>
+          </a:xfrm>
+          <a:prstGeom prst="rect">
+            <a:avLst/>
+          </a:prstGeom>
+          <a:solidFill>
+            <a:srgbClr val="FF0000"/>
+          </a:solidFill>
+        </p:spPr>
+        <p:style>
+          <a:lnRef idx="2">
+            <a:schemeClr val="accent1">
+              <a:shade val="50000"/>
+            </a:schemeClr>
+          </a:lnRef>
+          <a:fillRef idx="1">
+            <a:schemeClr val="accent1"/>
+          </a:fillRef>
+          <a:effectRef idx="0">
+            <a:schemeClr val="accent1"/>
+          </a:effectRef>
+          <a:fontRef idx="minor">
+            <a:schemeClr val="lt1"/>
+          </a:fontRef>
+        </p:style>
+        <p:txBody>
+          <a:bodyPr rtlCol="0" anchor="ctr"/>
+          <a:lstStyle/>
+          <a:p>
+            <a:pPr algn="ctr"/>
+            <a:endParaRPr lang="ko-KR" altLang="en-US"/>
+          </a:p>
+        </p:txBody>
+      </p:sp>
+      <p:sp>
+        <p:nvSpPr>
+          <p:cNvPr id="54" name="직사각형 53">
+            <a:extLst>
+              <a:ext uri="{FF2B5EF4-FFF2-40B4-BE49-F238E27FC236}">
+                <a16:creationId xmlns:a16="http://schemas.microsoft.com/office/drawing/2014/main" id="{86FD3CA8-45A0-405B-95AE-082C980E16F4}"/>
+              </a:ext>
+            </a:extLst>
+          </p:cNvPr>
+          <p:cNvSpPr/>
+          <p:nvPr/>
+        </p:nvSpPr>
+        <p:spPr>
+          <a:xfrm>
+            <a:off x="1608900" y="918332"/>
+            <a:ext cx="154894" cy="139197"/>
+          </a:xfrm>
+          <a:prstGeom prst="rect">
+            <a:avLst/>
+          </a:prstGeom>
+          <a:solidFill>
+            <a:srgbClr val="FF0000"/>
+          </a:solidFill>
+        </p:spPr>
+        <p:style>
+          <a:lnRef idx="2">
+            <a:schemeClr val="accent1">
+              <a:shade val="50000"/>
+            </a:schemeClr>
+          </a:lnRef>
+          <a:fillRef idx="1">
+            <a:schemeClr val="accent1"/>
+          </a:fillRef>
+          <a:effectRef idx="0">
+            <a:schemeClr val="accent1"/>
+          </a:effectRef>
+          <a:fontRef idx="minor">
+            <a:schemeClr val="lt1"/>
+          </a:fontRef>
+        </p:style>
+        <p:txBody>
+          <a:bodyPr rtlCol="0" anchor="ctr"/>
+          <a:lstStyle/>
+          <a:p>
+            <a:pPr algn="ctr"/>
+            <a:endParaRPr lang="ko-KR" altLang="en-US"/>
+          </a:p>
+        </p:txBody>
+      </p:sp>
+      <p:sp>
+        <p:nvSpPr>
+          <p:cNvPr id="55" name="직사각형 54">
+            <a:extLst>
+              <a:ext uri="{FF2B5EF4-FFF2-40B4-BE49-F238E27FC236}">
+                <a16:creationId xmlns:a16="http://schemas.microsoft.com/office/drawing/2014/main" id="{AE06F886-C984-4AD8-833B-1F706D6DBBC8}"/>
+              </a:ext>
+            </a:extLst>
+          </p:cNvPr>
+          <p:cNvSpPr/>
+          <p:nvPr/>
+        </p:nvSpPr>
+        <p:spPr>
+          <a:xfrm>
+            <a:off x="2502765" y="1271998"/>
+            <a:ext cx="154894" cy="139197"/>
+          </a:xfrm>
+          <a:prstGeom prst="rect">
+            <a:avLst/>
+          </a:prstGeom>
+          <a:solidFill>
+            <a:srgbClr val="FF0000"/>
+          </a:solidFill>
+        </p:spPr>
+        <p:style>
+          <a:lnRef idx="2">
+            <a:schemeClr val="accent1">
+              <a:shade val="50000"/>
+            </a:schemeClr>
+          </a:lnRef>
+          <a:fillRef idx="1">
+            <a:schemeClr val="accent1"/>
+          </a:fillRef>
+          <a:effectRef idx="0">
+            <a:schemeClr val="accent1"/>
+          </a:effectRef>
+          <a:fontRef idx="minor">
+            <a:schemeClr val="lt1"/>
+          </a:fontRef>
+        </p:style>
+        <p:txBody>
+          <a:bodyPr rtlCol="0" anchor="ctr"/>
+          <a:lstStyle/>
+          <a:p>
+            <a:pPr algn="ctr"/>
+            <a:endParaRPr lang="ko-KR" altLang="en-US"/>
+          </a:p>
+        </p:txBody>
+      </p:sp>
+    </p:spTree>
+    <p:extLst>
+      <p:ext uri="{BB962C8B-B14F-4D97-AF65-F5344CB8AC3E}">
+        <p14:creationId xmlns:p14="http://schemas.microsoft.com/office/powerpoint/2010/main" val="4200191877"/>
+      </p:ext>
+    </p:extLst>
+  </p:cSld>
+  <p:clrMapOvr>
+    <a:masterClrMapping/>
+  </p:clrMapOvr>
+</p:sld>
+</file>
+
+<file path=ppt/slides/slide4.xml><?xml version="1.0" encoding="utf-8"?>
+<p:sld xmlns:a="http://schemas.openxmlformats.org/drawingml/2006/main" xmlns:r="http://schemas.openxmlformats.org/officeDocument/2006/relationships" xmlns:p="http://schemas.openxmlformats.org/presentationml/2006/main">
+  <p:cSld>
+    <p:spTree>
+      <p:nvGrpSpPr>
+        <p:cNvPr id="1" name=""/>
+        <p:cNvGrpSpPr/>
+        <p:nvPr/>
+      </p:nvGrpSpPr>
+      <p:grpSpPr>
+        <a:xfrm>
+          <a:off x="0" y="0"/>
+          <a:ext cx="0" cy="0"/>
+          <a:chOff x="0" y="0"/>
+          <a:chExt cx="0" cy="0"/>
+        </a:xfrm>
+      </p:grpSpPr>
       <p:pic>
         <p:nvPicPr>
           <p:cNvPr id="2" name="그림 1">

</xml_diff>